<commit_message>
note for Nov. 5th
</commit_message>
<xml_diff>
--- a/doc/meeting_11052020.pptx
+++ b/doc/meeting_11052020.pptx
@@ -6,11 +6,22 @@
   </p:sldMasterIdLst>
   <p:sldIdLst>
     <p:sldId id="256" r:id="rId2"/>
-    <p:sldId id="257" r:id="rId3"/>
-    <p:sldId id="258" r:id="rId4"/>
-    <p:sldId id="259" r:id="rId5"/>
-    <p:sldId id="260" r:id="rId6"/>
-    <p:sldId id="261" r:id="rId7"/>
+    <p:sldId id="263" r:id="rId3"/>
+    <p:sldId id="268" r:id="rId4"/>
+    <p:sldId id="262" r:id="rId5"/>
+    <p:sldId id="264" r:id="rId6"/>
+    <p:sldId id="257" r:id="rId7"/>
+    <p:sldId id="267" r:id="rId8"/>
+    <p:sldId id="258" r:id="rId9"/>
+    <p:sldId id="260" r:id="rId10"/>
+    <p:sldId id="266" r:id="rId11"/>
+    <p:sldId id="265" r:id="rId12"/>
+    <p:sldId id="259" r:id="rId13"/>
+    <p:sldId id="261" r:id="rId14"/>
+    <p:sldId id="269" r:id="rId15"/>
+    <p:sldId id="272" r:id="rId16"/>
+    <p:sldId id="270" r:id="rId17"/>
+    <p:sldId id="271" r:id="rId18"/>
   </p:sldIdLst>
   <p:sldSz cx="12192000" cy="6858000"/>
   <p:notesSz cx="6858000" cy="9144000"/>
@@ -3349,7 +3360,7 @@
           <a:p>
             <a:r>
               <a:rPr lang="en-US" dirty="0"/>
-              <a:t>Decision tree</a:t>
+              <a:t>Decision tree overview</a:t>
             </a:r>
           </a:p>
         </p:txBody>
@@ -3375,7 +3386,10 @@
           <a:bodyPr/>
           <a:lstStyle/>
           <a:p>
-            <a:endParaRPr lang="en-US"/>
+            <a:r>
+              <a:rPr lang="en-US" dirty="0"/>
+              <a:t>11052020</a:t>
+            </a:r>
           </a:p>
         </p:txBody>
       </p:sp>
@@ -3383,6 +3397,988 @@
     <p:extLst>
       <p:ext uri="{BB962C8B-B14F-4D97-AF65-F5344CB8AC3E}">
         <p14:creationId xmlns:p14="http://schemas.microsoft.com/office/powerpoint/2010/main" val="3450415866"/>
+      </p:ext>
+    </p:extLst>
+  </p:cSld>
+  <p:clrMapOvr>
+    <a:masterClrMapping/>
+  </p:clrMapOvr>
+</p:sld>
+</file>
+
+<file path=ppt/slides/slide10.xml><?xml version="1.0" encoding="utf-8"?>
+<p:sld xmlns:a="http://schemas.openxmlformats.org/drawingml/2006/main" xmlns:r="http://schemas.openxmlformats.org/officeDocument/2006/relationships" xmlns:p="http://schemas.openxmlformats.org/presentationml/2006/main">
+  <p:cSld>
+    <p:spTree>
+      <p:nvGrpSpPr>
+        <p:cNvPr id="1" name=""/>
+        <p:cNvGrpSpPr/>
+        <p:nvPr/>
+      </p:nvGrpSpPr>
+      <p:grpSpPr>
+        <a:xfrm>
+          <a:off x="0" y="0"/>
+          <a:ext cx="0" cy="0"/>
+          <a:chOff x="0" y="0"/>
+          <a:chExt cx="0" cy="0"/>
+        </a:xfrm>
+      </p:grpSpPr>
+      <p:sp>
+        <p:nvSpPr>
+          <p:cNvPr id="2" name="Title 1">
+            <a:extLst>
+              <a:ext uri="{FF2B5EF4-FFF2-40B4-BE49-F238E27FC236}">
+                <a16:creationId xmlns:a16="http://schemas.microsoft.com/office/drawing/2014/main" id="{3B71FA8A-929C-CD48-99A8-3A723883196C}"/>
+              </a:ext>
+            </a:extLst>
+          </p:cNvPr>
+          <p:cNvSpPr>
+            <a:spLocks noGrp="1"/>
+          </p:cNvSpPr>
+          <p:nvPr>
+            <p:ph type="title"/>
+          </p:nvPr>
+        </p:nvSpPr>
+        <p:spPr/>
+        <p:txBody>
+          <a:bodyPr/>
+          <a:lstStyle/>
+          <a:p>
+            <a:r>
+              <a:rPr lang="en-US" dirty="0"/>
+              <a:t>[ Female, Age &lt;9, sibling &lt;2.9]</a:t>
+            </a:r>
+          </a:p>
+        </p:txBody>
+      </p:sp>
+      <p:sp>
+        <p:nvSpPr>
+          <p:cNvPr id="5" name="TextBox 4">
+            <a:extLst>
+              <a:ext uri="{FF2B5EF4-FFF2-40B4-BE49-F238E27FC236}">
+                <a16:creationId xmlns:a16="http://schemas.microsoft.com/office/drawing/2014/main" id="{CBA07D81-5E2B-A945-B139-D7823B4029E7}"/>
+              </a:ext>
+            </a:extLst>
+          </p:cNvPr>
+          <p:cNvSpPr txBox="1"/>
+          <p:nvPr/>
+        </p:nvSpPr>
+        <p:spPr>
+          <a:xfrm>
+            <a:off x="7693572" y="3620016"/>
+            <a:ext cx="3033779" cy="369332"/>
+          </a:xfrm>
+          <a:prstGeom prst="rect">
+            <a:avLst/>
+          </a:prstGeom>
+          <a:noFill/>
+        </p:spPr>
+        <p:txBody>
+          <a:bodyPr wrap="none" rtlCol="0">
+            <a:spAutoFit/>
+          </a:bodyPr>
+          <a:lstStyle/>
+          <a:p>
+            <a:r>
+              <a:rPr lang="en-US" dirty="0"/>
+              <a:t>Survival rate = 16/17 = 94.11%</a:t>
+            </a:r>
+          </a:p>
+        </p:txBody>
+      </p:sp>
+      <p:pic>
+        <p:nvPicPr>
+          <p:cNvPr id="6" name="Picture 5">
+            <a:extLst>
+              <a:ext uri="{FF2B5EF4-FFF2-40B4-BE49-F238E27FC236}">
+                <a16:creationId xmlns:a16="http://schemas.microsoft.com/office/drawing/2014/main" id="{32C3FF67-192F-8742-B30C-78F8284F540A}"/>
+              </a:ext>
+            </a:extLst>
+          </p:cNvPr>
+          <p:cNvPicPr>
+            <a:picLocks noChangeAspect="1"/>
+          </p:cNvPicPr>
+          <p:nvPr/>
+        </p:nvPicPr>
+        <p:blipFill>
+          <a:blip r:embed="rId2"/>
+          <a:stretch>
+            <a:fillRect/>
+          </a:stretch>
+        </p:blipFill>
+        <p:spPr>
+          <a:xfrm>
+            <a:off x="1915292" y="1690688"/>
+            <a:ext cx="3568700" cy="4013200"/>
+          </a:xfrm>
+          <a:prstGeom prst="rect">
+            <a:avLst/>
+          </a:prstGeom>
+        </p:spPr>
+      </p:pic>
+    </p:spTree>
+    <p:extLst>
+      <p:ext uri="{BB962C8B-B14F-4D97-AF65-F5344CB8AC3E}">
+        <p14:creationId xmlns:p14="http://schemas.microsoft.com/office/powerpoint/2010/main" val="213226162"/>
+      </p:ext>
+    </p:extLst>
+  </p:cSld>
+  <p:clrMapOvr>
+    <a:masterClrMapping/>
+  </p:clrMapOvr>
+</p:sld>
+</file>
+
+<file path=ppt/slides/slide11.xml><?xml version="1.0" encoding="utf-8"?>
+<p:sld xmlns:a="http://schemas.openxmlformats.org/drawingml/2006/main" xmlns:r="http://schemas.openxmlformats.org/officeDocument/2006/relationships" xmlns:p="http://schemas.openxmlformats.org/presentationml/2006/main">
+  <p:cSld>
+    <p:spTree>
+      <p:nvGrpSpPr>
+        <p:cNvPr id="1" name=""/>
+        <p:cNvGrpSpPr/>
+        <p:nvPr/>
+      </p:nvGrpSpPr>
+      <p:grpSpPr>
+        <a:xfrm>
+          <a:off x="0" y="0"/>
+          <a:ext cx="0" cy="0"/>
+          <a:chOff x="0" y="0"/>
+          <a:chExt cx="0" cy="0"/>
+        </a:xfrm>
+      </p:grpSpPr>
+      <p:sp>
+        <p:nvSpPr>
+          <p:cNvPr id="2" name="Title 1">
+            <a:extLst>
+              <a:ext uri="{FF2B5EF4-FFF2-40B4-BE49-F238E27FC236}">
+                <a16:creationId xmlns:a16="http://schemas.microsoft.com/office/drawing/2014/main" id="{3B71FA8A-929C-CD48-99A8-3A723883196C}"/>
+              </a:ext>
+            </a:extLst>
+          </p:cNvPr>
+          <p:cNvSpPr>
+            <a:spLocks noGrp="1"/>
+          </p:cNvSpPr>
+          <p:nvPr>
+            <p:ph type="title"/>
+          </p:nvPr>
+        </p:nvSpPr>
+        <p:spPr/>
+        <p:txBody>
+          <a:bodyPr/>
+          <a:lstStyle/>
+          <a:p>
+            <a:r>
+              <a:rPr lang="en-US" dirty="0"/>
+              <a:t>[ Male, Age &lt;9, sibling &lt;2.9]</a:t>
+            </a:r>
+          </a:p>
+        </p:txBody>
+      </p:sp>
+      <p:pic>
+        <p:nvPicPr>
+          <p:cNvPr id="4" name="Picture 3">
+            <a:extLst>
+              <a:ext uri="{FF2B5EF4-FFF2-40B4-BE49-F238E27FC236}">
+                <a16:creationId xmlns:a16="http://schemas.microsoft.com/office/drawing/2014/main" id="{3F4E0441-7E6B-444D-A51C-D05347A394CD}"/>
+              </a:ext>
+            </a:extLst>
+          </p:cNvPr>
+          <p:cNvPicPr>
+            <a:picLocks noChangeAspect="1"/>
+          </p:cNvPicPr>
+          <p:nvPr/>
+        </p:nvPicPr>
+        <p:blipFill>
+          <a:blip r:embed="rId2"/>
+          <a:stretch>
+            <a:fillRect/>
+          </a:stretch>
+        </p:blipFill>
+        <p:spPr>
+          <a:xfrm>
+            <a:off x="1368533" y="1690688"/>
+            <a:ext cx="4580321" cy="4227989"/>
+          </a:xfrm>
+          <a:prstGeom prst="rect">
+            <a:avLst/>
+          </a:prstGeom>
+        </p:spPr>
+      </p:pic>
+      <p:sp>
+        <p:nvSpPr>
+          <p:cNvPr id="5" name="TextBox 4">
+            <a:extLst>
+              <a:ext uri="{FF2B5EF4-FFF2-40B4-BE49-F238E27FC236}">
+                <a16:creationId xmlns:a16="http://schemas.microsoft.com/office/drawing/2014/main" id="{CBA07D81-5E2B-A945-B139-D7823B4029E7}"/>
+              </a:ext>
+            </a:extLst>
+          </p:cNvPr>
+          <p:cNvSpPr txBox="1"/>
+          <p:nvPr/>
+        </p:nvSpPr>
+        <p:spPr>
+          <a:xfrm>
+            <a:off x="7693572" y="3620016"/>
+            <a:ext cx="3033779" cy="369332"/>
+          </a:xfrm>
+          <a:prstGeom prst="rect">
+            <a:avLst/>
+          </a:prstGeom>
+          <a:noFill/>
+        </p:spPr>
+        <p:txBody>
+          <a:bodyPr wrap="none" rtlCol="0">
+            <a:spAutoFit/>
+          </a:bodyPr>
+          <a:lstStyle/>
+          <a:p>
+            <a:r>
+              <a:rPr lang="en-US" dirty="0"/>
+              <a:t>Survival rate = 13/14 = 92.86%</a:t>
+            </a:r>
+          </a:p>
+        </p:txBody>
+      </p:sp>
+    </p:spTree>
+    <p:extLst>
+      <p:ext uri="{BB962C8B-B14F-4D97-AF65-F5344CB8AC3E}">
+        <p14:creationId xmlns:p14="http://schemas.microsoft.com/office/powerpoint/2010/main" val="2769361594"/>
+      </p:ext>
+    </p:extLst>
+  </p:cSld>
+  <p:clrMapOvr>
+    <a:masterClrMapping/>
+  </p:clrMapOvr>
+</p:sld>
+</file>
+
+<file path=ppt/slides/slide12.xml><?xml version="1.0" encoding="utf-8"?>
+<p:sld xmlns:a="http://schemas.openxmlformats.org/drawingml/2006/main" xmlns:r="http://schemas.openxmlformats.org/officeDocument/2006/relationships" xmlns:p="http://schemas.openxmlformats.org/presentationml/2006/main">
+  <p:cSld>
+    <p:spTree>
+      <p:nvGrpSpPr>
+        <p:cNvPr id="1" name=""/>
+        <p:cNvGrpSpPr/>
+        <p:nvPr/>
+      </p:nvGrpSpPr>
+      <p:grpSpPr>
+        <a:xfrm>
+          <a:off x="0" y="0"/>
+          <a:ext cx="0" cy="0"/>
+          <a:chOff x="0" y="0"/>
+          <a:chExt cx="0" cy="0"/>
+        </a:xfrm>
+      </p:grpSpPr>
+      <p:sp>
+        <p:nvSpPr>
+          <p:cNvPr id="2" name="Title 1">
+            <a:extLst>
+              <a:ext uri="{FF2B5EF4-FFF2-40B4-BE49-F238E27FC236}">
+                <a16:creationId xmlns:a16="http://schemas.microsoft.com/office/drawing/2014/main" id="{AFD9D84A-7D7D-7A4E-9A42-EFE62A1CDDFE}"/>
+              </a:ext>
+            </a:extLst>
+          </p:cNvPr>
+          <p:cNvSpPr>
+            <a:spLocks noGrp="1"/>
+          </p:cNvSpPr>
+          <p:nvPr>
+            <p:ph type="title"/>
+          </p:nvPr>
+        </p:nvSpPr>
+        <p:spPr/>
+        <p:txBody>
+          <a:bodyPr/>
+          <a:lstStyle/>
+          <a:p>
+            <a:r>
+              <a:rPr lang="en-US" dirty="0"/>
+              <a:t>Requirement</a:t>
+            </a:r>
+          </a:p>
+        </p:txBody>
+      </p:sp>
+      <p:sp>
+        <p:nvSpPr>
+          <p:cNvPr id="3" name="Content Placeholder 2">
+            <a:extLst>
+              <a:ext uri="{FF2B5EF4-FFF2-40B4-BE49-F238E27FC236}">
+                <a16:creationId xmlns:a16="http://schemas.microsoft.com/office/drawing/2014/main" id="{4DD69B43-AC93-DB44-89FF-FC4368062DEE}"/>
+              </a:ext>
+            </a:extLst>
+          </p:cNvPr>
+          <p:cNvSpPr>
+            <a:spLocks noGrp="1"/>
+          </p:cNvSpPr>
+          <p:nvPr>
+            <p:ph idx="1"/>
+          </p:nvPr>
+        </p:nvSpPr>
+        <p:spPr/>
+        <p:txBody>
+          <a:bodyPr>
+            <a:normAutofit lnSpcReduction="10000"/>
+          </a:bodyPr>
+          <a:lstStyle/>
+          <a:p>
+            <a:r>
+              <a:rPr lang="en-US" dirty="0"/>
+              <a:t>Prediction features</a:t>
+            </a:r>
+          </a:p>
+          <a:p>
+            <a:pPr lvl="1"/>
+            <a:r>
+              <a:rPr lang="en-US" dirty="0"/>
+              <a:t>Gender</a:t>
+            </a:r>
+          </a:p>
+          <a:p>
+            <a:pPr lvl="1"/>
+            <a:r>
+              <a:rPr lang="en-US" dirty="0"/>
+              <a:t>Age</a:t>
+            </a:r>
+          </a:p>
+          <a:p>
+            <a:pPr lvl="1"/>
+            <a:r>
+              <a:rPr lang="en-US" dirty="0"/>
+              <a:t>Number of siblings</a:t>
+            </a:r>
+          </a:p>
+          <a:p>
+            <a:r>
+              <a:rPr lang="en-US" dirty="0"/>
+              <a:t>Prediction outcome</a:t>
+            </a:r>
+          </a:p>
+          <a:p>
+            <a:pPr lvl="1"/>
+            <a:r>
+              <a:rPr lang="en-US" dirty="0"/>
+              <a:t>Survival (%)</a:t>
+            </a:r>
+          </a:p>
+          <a:p>
+            <a:r>
+              <a:rPr lang="en-US" dirty="0"/>
+              <a:t>Procedure</a:t>
+            </a:r>
+          </a:p>
+          <a:p>
+            <a:pPr lvl="1"/>
+            <a:r>
+              <a:rPr lang="en-US" dirty="0"/>
+              <a:t>The entries of the decision vector and applies a threshold. </a:t>
+            </a:r>
+          </a:p>
+          <a:p>
+            <a:pPr lvl="1"/>
+            <a:r>
+              <a:rPr lang="en-US" dirty="0"/>
+              <a:t>Depending on the result of the comparison, we branch left or right. </a:t>
+            </a:r>
+          </a:p>
+          <a:p>
+            <a:pPr lvl="1"/>
+            <a:r>
+              <a:rPr lang="en-US" dirty="0"/>
+              <a:t>A feature vector enters the tree by the root. </a:t>
+            </a:r>
+          </a:p>
+          <a:p>
+            <a:pPr lvl="1"/>
+            <a:r>
+              <a:rPr lang="en-US" dirty="0"/>
+              <a:t>It follows a series of comparisons leading to a leaf of the tree. </a:t>
+            </a:r>
+          </a:p>
+          <a:p>
+            <a:endParaRPr lang="en-US" dirty="0"/>
+          </a:p>
+        </p:txBody>
+      </p:sp>
+    </p:spTree>
+    <p:extLst>
+      <p:ext uri="{BB962C8B-B14F-4D97-AF65-F5344CB8AC3E}">
+        <p14:creationId xmlns:p14="http://schemas.microsoft.com/office/powerpoint/2010/main" val="3527479487"/>
+      </p:ext>
+    </p:extLst>
+  </p:cSld>
+  <p:clrMapOvr>
+    <a:masterClrMapping/>
+  </p:clrMapOvr>
+</p:sld>
+</file>
+
+<file path=ppt/slides/slide13.xml><?xml version="1.0" encoding="utf-8"?>
+<p:sld xmlns:a="http://schemas.openxmlformats.org/drawingml/2006/main" xmlns:r="http://schemas.openxmlformats.org/officeDocument/2006/relationships" xmlns:p="http://schemas.openxmlformats.org/presentationml/2006/main">
+  <p:cSld>
+    <p:spTree>
+      <p:nvGrpSpPr>
+        <p:cNvPr id="1" name=""/>
+        <p:cNvGrpSpPr/>
+        <p:nvPr/>
+      </p:nvGrpSpPr>
+      <p:grpSpPr>
+        <a:xfrm>
+          <a:off x="0" y="0"/>
+          <a:ext cx="0" cy="0"/>
+          <a:chOff x="0" y="0"/>
+          <a:chExt cx="0" cy="0"/>
+        </a:xfrm>
+      </p:grpSpPr>
+      <p:sp>
+        <p:nvSpPr>
+          <p:cNvPr id="2" name="Title 1">
+            <a:extLst>
+              <a:ext uri="{FF2B5EF4-FFF2-40B4-BE49-F238E27FC236}">
+                <a16:creationId xmlns:a16="http://schemas.microsoft.com/office/drawing/2014/main" id="{2E8BB92C-021A-C542-B352-892081A2781D}"/>
+              </a:ext>
+            </a:extLst>
+          </p:cNvPr>
+          <p:cNvSpPr>
+            <a:spLocks noGrp="1"/>
+          </p:cNvSpPr>
+          <p:nvPr>
+            <p:ph type="title"/>
+          </p:nvPr>
+        </p:nvSpPr>
+        <p:spPr/>
+        <p:txBody>
+          <a:bodyPr/>
+          <a:lstStyle/>
+          <a:p>
+            <a:r>
+              <a:rPr lang="en-US" dirty="0"/>
+              <a:t>How do human language match the computer language</a:t>
+            </a:r>
+          </a:p>
+        </p:txBody>
+      </p:sp>
+      <p:sp>
+        <p:nvSpPr>
+          <p:cNvPr id="3" name="Content Placeholder 2">
+            <a:extLst>
+              <a:ext uri="{FF2B5EF4-FFF2-40B4-BE49-F238E27FC236}">
+                <a16:creationId xmlns:a16="http://schemas.microsoft.com/office/drawing/2014/main" id="{1D9296A9-874B-744D-8799-09C0F98E35DC}"/>
+              </a:ext>
+            </a:extLst>
+          </p:cNvPr>
+          <p:cNvSpPr>
+            <a:spLocks noGrp="1"/>
+          </p:cNvSpPr>
+          <p:nvPr>
+            <p:ph idx="1"/>
+          </p:nvPr>
+        </p:nvSpPr>
+        <p:spPr/>
+        <p:txBody>
+          <a:bodyPr>
+            <a:normAutofit/>
+          </a:bodyPr>
+          <a:lstStyle/>
+          <a:p>
+            <a:r>
+              <a:rPr lang="en-US" dirty="0"/>
+              <a:t>The entries of the decision vector and applies a threshold</a:t>
+            </a:r>
+          </a:p>
+          <a:p>
+            <a:pPr lvl="1"/>
+            <a:r>
+              <a:rPr lang="en-US" dirty="0"/>
+              <a:t>Which method does this job?</a:t>
+            </a:r>
+          </a:p>
+          <a:p>
+            <a:r>
+              <a:rPr lang="en-US" dirty="0"/>
+              <a:t>Depending on the result of the comparison, we branch left or right</a:t>
+            </a:r>
+          </a:p>
+          <a:p>
+            <a:pPr lvl="1"/>
+            <a:r>
+              <a:rPr lang="en-US" dirty="0"/>
+              <a:t>Which method does this job?</a:t>
+            </a:r>
+          </a:p>
+          <a:p>
+            <a:r>
+              <a:rPr lang="en-US" dirty="0"/>
+              <a:t>A feature vector enters the tree by the root</a:t>
+            </a:r>
+          </a:p>
+          <a:p>
+            <a:pPr lvl="1"/>
+            <a:r>
+              <a:rPr lang="en-US" dirty="0"/>
+              <a:t>Which method does this job?</a:t>
+            </a:r>
+          </a:p>
+          <a:p>
+            <a:r>
+              <a:rPr lang="en-US" dirty="0"/>
+              <a:t>It follows a series of comparisons leading to a leaf of the tree</a:t>
+            </a:r>
+          </a:p>
+          <a:p>
+            <a:pPr lvl="1"/>
+            <a:r>
+              <a:rPr lang="en-US" dirty="0"/>
+              <a:t>What is the end result?</a:t>
+            </a:r>
+          </a:p>
+          <a:p>
+            <a:endParaRPr lang="en-US" dirty="0"/>
+          </a:p>
+        </p:txBody>
+      </p:sp>
+    </p:spTree>
+    <p:extLst>
+      <p:ext uri="{BB962C8B-B14F-4D97-AF65-F5344CB8AC3E}">
+        <p14:creationId xmlns:p14="http://schemas.microsoft.com/office/powerpoint/2010/main" val="4191807013"/>
+      </p:ext>
+    </p:extLst>
+  </p:cSld>
+  <p:clrMapOvr>
+    <a:masterClrMapping/>
+  </p:clrMapOvr>
+</p:sld>
+</file>
+
+<file path=ppt/slides/slide14.xml><?xml version="1.0" encoding="utf-8"?>
+<p:sld xmlns:a="http://schemas.openxmlformats.org/drawingml/2006/main" xmlns:r="http://schemas.openxmlformats.org/officeDocument/2006/relationships" xmlns:p="http://schemas.openxmlformats.org/presentationml/2006/main">
+  <p:cSld>
+    <p:spTree>
+      <p:nvGrpSpPr>
+        <p:cNvPr id="1" name=""/>
+        <p:cNvGrpSpPr/>
+        <p:nvPr/>
+      </p:nvGrpSpPr>
+      <p:grpSpPr>
+        <a:xfrm>
+          <a:off x="0" y="0"/>
+          <a:ext cx="0" cy="0"/>
+          <a:chOff x="0" y="0"/>
+          <a:chExt cx="0" cy="0"/>
+        </a:xfrm>
+      </p:grpSpPr>
+      <p:sp>
+        <p:nvSpPr>
+          <p:cNvPr id="2" name="Title 1">
+            <a:extLst>
+              <a:ext uri="{FF2B5EF4-FFF2-40B4-BE49-F238E27FC236}">
+                <a16:creationId xmlns:a16="http://schemas.microsoft.com/office/drawing/2014/main" id="{198E1F6B-A86B-B94E-9CC4-E00D4DB5B229}"/>
+              </a:ext>
+            </a:extLst>
+          </p:cNvPr>
+          <p:cNvSpPr>
+            <a:spLocks noGrp="1"/>
+          </p:cNvSpPr>
+          <p:nvPr>
+            <p:ph type="title"/>
+          </p:nvPr>
+        </p:nvSpPr>
+        <p:spPr/>
+        <p:txBody>
+          <a:bodyPr/>
+          <a:lstStyle/>
+          <a:p>
+            <a:r>
+              <a:rPr lang="en-US" dirty="0"/>
+              <a:t>The only possible explanation</a:t>
+            </a:r>
+          </a:p>
+        </p:txBody>
+      </p:sp>
+      <p:sp>
+        <p:nvSpPr>
+          <p:cNvPr id="3" name="Content Placeholder 2">
+            <a:extLst>
+              <a:ext uri="{FF2B5EF4-FFF2-40B4-BE49-F238E27FC236}">
+                <a16:creationId xmlns:a16="http://schemas.microsoft.com/office/drawing/2014/main" id="{87F63758-175D-4148-A24F-B6B5167129B8}"/>
+              </a:ext>
+            </a:extLst>
+          </p:cNvPr>
+          <p:cNvSpPr>
+            <a:spLocks noGrp="1"/>
+          </p:cNvSpPr>
+          <p:nvPr>
+            <p:ph idx="1"/>
+          </p:nvPr>
+        </p:nvSpPr>
+        <p:spPr>
+          <a:xfrm>
+            <a:off x="838199" y="3479303"/>
+            <a:ext cx="10515600" cy="2385469"/>
+          </a:xfrm>
+        </p:spPr>
+        <p:txBody>
+          <a:bodyPr>
+            <a:normAutofit lnSpcReduction="10000"/>
+          </a:bodyPr>
+          <a:lstStyle/>
+          <a:p>
+            <a:r>
+              <a:rPr lang="en-US" dirty="0"/>
+              <a:t>There are 663 entries</a:t>
+            </a:r>
+          </a:p>
+          <a:p>
+            <a:r>
+              <a:rPr lang="en-US" dirty="0"/>
+              <a:t>Of which, there are 239 females</a:t>
+            </a:r>
+          </a:p>
+          <a:p>
+            <a:r>
+              <a:rPr lang="en-US" dirty="0"/>
+              <a:t>Then, out of 239 females, 180 survived</a:t>
+            </a:r>
+          </a:p>
+          <a:p>
+            <a:r>
+              <a:rPr lang="en-US" dirty="0"/>
+              <a:t>Therefore, it reports as 180/663 = 27.15%</a:t>
+            </a:r>
+          </a:p>
+          <a:p>
+            <a:r>
+              <a:rPr lang="en-US" dirty="0"/>
+              <a:t>I think it is </a:t>
+            </a:r>
+            <a:r>
+              <a:rPr lang="en-US" b="1" dirty="0">
+                <a:solidFill>
+                  <a:srgbClr val="FF0000"/>
+                </a:solidFill>
+              </a:rPr>
+              <a:t>WRONG!</a:t>
+            </a:r>
+          </a:p>
+        </p:txBody>
+      </p:sp>
+      <p:pic>
+        <p:nvPicPr>
+          <p:cNvPr id="7" name="Picture 6">
+            <a:extLst>
+              <a:ext uri="{FF2B5EF4-FFF2-40B4-BE49-F238E27FC236}">
+                <a16:creationId xmlns:a16="http://schemas.microsoft.com/office/drawing/2014/main" id="{C7A2A17D-B5D0-F745-B68A-354B2EDB0709}"/>
+              </a:ext>
+            </a:extLst>
+          </p:cNvPr>
+          <p:cNvPicPr>
+            <a:picLocks noChangeAspect="1"/>
+          </p:cNvPicPr>
+          <p:nvPr/>
+        </p:nvPicPr>
+        <p:blipFill>
+          <a:blip r:embed="rId2"/>
+          <a:stretch>
+            <a:fillRect/>
+          </a:stretch>
+        </p:blipFill>
+        <p:spPr>
+          <a:xfrm>
+            <a:off x="1010197" y="1568119"/>
+            <a:ext cx="10171605" cy="1536948"/>
+          </a:xfrm>
+          <a:prstGeom prst="rect">
+            <a:avLst/>
+          </a:prstGeom>
+        </p:spPr>
+      </p:pic>
+    </p:spTree>
+    <p:extLst>
+      <p:ext uri="{BB962C8B-B14F-4D97-AF65-F5344CB8AC3E}">
+        <p14:creationId xmlns:p14="http://schemas.microsoft.com/office/powerpoint/2010/main" val="940441100"/>
+      </p:ext>
+    </p:extLst>
+  </p:cSld>
+  <p:clrMapOvr>
+    <a:masterClrMapping/>
+  </p:clrMapOvr>
+</p:sld>
+</file>
+
+<file path=ppt/slides/slide15.xml><?xml version="1.0" encoding="utf-8"?>
+<p:sld xmlns:a="http://schemas.openxmlformats.org/drawingml/2006/main" xmlns:r="http://schemas.openxmlformats.org/officeDocument/2006/relationships" xmlns:p="http://schemas.openxmlformats.org/presentationml/2006/main">
+  <p:cSld>
+    <p:spTree>
+      <p:nvGrpSpPr>
+        <p:cNvPr id="1" name=""/>
+        <p:cNvGrpSpPr/>
+        <p:nvPr/>
+      </p:nvGrpSpPr>
+      <p:grpSpPr>
+        <a:xfrm>
+          <a:off x="0" y="0"/>
+          <a:ext cx="0" cy="0"/>
+          <a:chOff x="0" y="0"/>
+          <a:chExt cx="0" cy="0"/>
+        </a:xfrm>
+      </p:grpSpPr>
+      <p:sp>
+        <p:nvSpPr>
+          <p:cNvPr id="2" name="Title 1">
+            <a:extLst>
+              <a:ext uri="{FF2B5EF4-FFF2-40B4-BE49-F238E27FC236}">
+                <a16:creationId xmlns:a16="http://schemas.microsoft.com/office/drawing/2014/main" id="{DCABE39E-B53A-BB4F-B669-91657F9A2908}"/>
+              </a:ext>
+            </a:extLst>
+          </p:cNvPr>
+          <p:cNvSpPr>
+            <a:spLocks noGrp="1"/>
+          </p:cNvSpPr>
+          <p:nvPr>
+            <p:ph type="title"/>
+          </p:nvPr>
+        </p:nvSpPr>
+        <p:spPr/>
+        <p:txBody>
+          <a:bodyPr>
+            <a:normAutofit/>
+          </a:bodyPr>
+          <a:lstStyle/>
+          <a:p>
+            <a:r>
+              <a:rPr lang="en-US" sz="4000" dirty="0"/>
+              <a:t>I think it is </a:t>
+            </a:r>
+            <a:r>
+              <a:rPr lang="en-US" sz="4000" b="1" dirty="0">
+                <a:solidFill>
+                  <a:srgbClr val="FF0000"/>
+                </a:solidFill>
+              </a:rPr>
+              <a:t>WRONG!</a:t>
+            </a:r>
+            <a:endParaRPr lang="en-US" sz="4000" dirty="0"/>
+          </a:p>
+        </p:txBody>
+      </p:sp>
+      <p:pic>
+        <p:nvPicPr>
+          <p:cNvPr id="4" name="Picture 3">
+            <a:extLst>
+              <a:ext uri="{FF2B5EF4-FFF2-40B4-BE49-F238E27FC236}">
+                <a16:creationId xmlns:a16="http://schemas.microsoft.com/office/drawing/2014/main" id="{B08CBF78-B54C-3C42-BBC2-686CD5E1F588}"/>
+              </a:ext>
+            </a:extLst>
+          </p:cNvPr>
+          <p:cNvPicPr>
+            <a:picLocks noChangeAspect="1"/>
+          </p:cNvPicPr>
+          <p:nvPr/>
+        </p:nvPicPr>
+        <p:blipFill>
+          <a:blip r:embed="rId2"/>
+          <a:stretch>
+            <a:fillRect/>
+          </a:stretch>
+        </p:blipFill>
+        <p:spPr>
+          <a:xfrm>
+            <a:off x="1339850" y="2275927"/>
+            <a:ext cx="9512300" cy="3378200"/>
+          </a:xfrm>
+          <a:prstGeom prst="rect">
+            <a:avLst/>
+          </a:prstGeom>
+        </p:spPr>
+      </p:pic>
+    </p:spTree>
+    <p:extLst>
+      <p:ext uri="{BB962C8B-B14F-4D97-AF65-F5344CB8AC3E}">
+        <p14:creationId xmlns:p14="http://schemas.microsoft.com/office/powerpoint/2010/main" val="3544900859"/>
+      </p:ext>
+    </p:extLst>
+  </p:cSld>
+  <p:clrMapOvr>
+    <a:masterClrMapping/>
+  </p:clrMapOvr>
+</p:sld>
+</file>
+
+<file path=ppt/slides/slide16.xml><?xml version="1.0" encoding="utf-8"?>
+<p:sld xmlns:a="http://schemas.openxmlformats.org/drawingml/2006/main" xmlns:r="http://schemas.openxmlformats.org/officeDocument/2006/relationships" xmlns:p="http://schemas.openxmlformats.org/presentationml/2006/main">
+  <p:cSld>
+    <p:spTree>
+      <p:nvGrpSpPr>
+        <p:cNvPr id="1" name=""/>
+        <p:cNvGrpSpPr/>
+        <p:nvPr/>
+      </p:nvGrpSpPr>
+      <p:grpSpPr>
+        <a:xfrm>
+          <a:off x="0" y="0"/>
+          <a:ext cx="0" cy="0"/>
+          <a:chOff x="0" y="0"/>
+          <a:chExt cx="0" cy="0"/>
+        </a:xfrm>
+      </p:grpSpPr>
+      <p:sp>
+        <p:nvSpPr>
+          <p:cNvPr id="2" name="Title 1">
+            <a:extLst>
+              <a:ext uri="{FF2B5EF4-FFF2-40B4-BE49-F238E27FC236}">
+                <a16:creationId xmlns:a16="http://schemas.microsoft.com/office/drawing/2014/main" id="{FEA63FD6-65E1-124B-95A1-CC4FDC52028C}"/>
+              </a:ext>
+            </a:extLst>
+          </p:cNvPr>
+          <p:cNvSpPr>
+            <a:spLocks noGrp="1"/>
+          </p:cNvSpPr>
+          <p:nvPr>
+            <p:ph type="title"/>
+          </p:nvPr>
+        </p:nvSpPr>
+        <p:spPr/>
+        <p:txBody>
+          <a:bodyPr/>
+          <a:lstStyle/>
+          <a:p>
+            <a:r>
+              <a:rPr lang="en-US" dirty="0"/>
+              <a:t>In the end of the day</a:t>
+            </a:r>
+          </a:p>
+        </p:txBody>
+      </p:sp>
+      <p:sp>
+        <p:nvSpPr>
+          <p:cNvPr id="3" name="Content Placeholder 2">
+            <a:extLst>
+              <a:ext uri="{FF2B5EF4-FFF2-40B4-BE49-F238E27FC236}">
+                <a16:creationId xmlns:a16="http://schemas.microsoft.com/office/drawing/2014/main" id="{CC0F311E-5A70-5944-8615-35763479D00D}"/>
+              </a:ext>
+            </a:extLst>
+          </p:cNvPr>
+          <p:cNvSpPr>
+            <a:spLocks noGrp="1"/>
+          </p:cNvSpPr>
+          <p:nvPr>
+            <p:ph idx="1"/>
+          </p:nvPr>
+        </p:nvSpPr>
+        <p:spPr/>
+        <p:txBody>
+          <a:bodyPr/>
+          <a:lstStyle/>
+          <a:p>
+            <a:r>
+              <a:rPr lang="en-US" dirty="0"/>
+              <a:t>Main task: to fill in all the missing “probabilities”</a:t>
+            </a:r>
+          </a:p>
+          <a:p>
+            <a:r>
+              <a:rPr lang="en-US" dirty="0"/>
+              <a:t>A few java methods need to be implemented/completed</a:t>
+            </a:r>
+          </a:p>
+          <a:p>
+            <a:r>
+              <a:rPr lang="en-US" dirty="0"/>
+              <a:t>Can you possibilities test this in your java program</a:t>
+            </a:r>
+          </a:p>
+        </p:txBody>
+      </p:sp>
+    </p:spTree>
+    <p:extLst>
+      <p:ext uri="{BB962C8B-B14F-4D97-AF65-F5344CB8AC3E}">
+        <p14:creationId xmlns:p14="http://schemas.microsoft.com/office/powerpoint/2010/main" val="2071582133"/>
+      </p:ext>
+    </p:extLst>
+  </p:cSld>
+  <p:clrMapOvr>
+    <a:masterClrMapping/>
+  </p:clrMapOvr>
+</p:sld>
+</file>
+
+<file path=ppt/slides/slide17.xml><?xml version="1.0" encoding="utf-8"?>
+<p:sld xmlns:a="http://schemas.openxmlformats.org/drawingml/2006/main" xmlns:r="http://schemas.openxmlformats.org/officeDocument/2006/relationships" xmlns:p="http://schemas.openxmlformats.org/presentationml/2006/main">
+  <p:cSld>
+    <p:spTree>
+      <p:nvGrpSpPr>
+        <p:cNvPr id="1" name=""/>
+        <p:cNvGrpSpPr/>
+        <p:nvPr/>
+      </p:nvGrpSpPr>
+      <p:grpSpPr>
+        <a:xfrm>
+          <a:off x="0" y="0"/>
+          <a:ext cx="0" cy="0"/>
+          <a:chOff x="0" y="0"/>
+          <a:chExt cx="0" cy="0"/>
+        </a:xfrm>
+      </p:grpSpPr>
+      <p:sp>
+        <p:nvSpPr>
+          <p:cNvPr id="2" name="Title 1">
+            <a:extLst>
+              <a:ext uri="{FF2B5EF4-FFF2-40B4-BE49-F238E27FC236}">
+                <a16:creationId xmlns:a16="http://schemas.microsoft.com/office/drawing/2014/main" id="{2DB12FC1-069B-1B4B-AB6D-384520AEE997}"/>
+              </a:ext>
+            </a:extLst>
+          </p:cNvPr>
+          <p:cNvSpPr>
+            <a:spLocks noGrp="1"/>
+          </p:cNvSpPr>
+          <p:nvPr>
+            <p:ph type="title"/>
+          </p:nvPr>
+        </p:nvSpPr>
+        <p:spPr/>
+        <p:txBody>
+          <a:bodyPr/>
+          <a:lstStyle/>
+          <a:p>
+            <a:r>
+              <a:rPr lang="en-US" dirty="0"/>
+              <a:t>Question 1: why all the results are NOT survived? </a:t>
+            </a:r>
+          </a:p>
+        </p:txBody>
+      </p:sp>
+      <p:pic>
+        <p:nvPicPr>
+          <p:cNvPr id="4" name="Picture 3">
+            <a:extLst>
+              <a:ext uri="{FF2B5EF4-FFF2-40B4-BE49-F238E27FC236}">
+                <a16:creationId xmlns:a16="http://schemas.microsoft.com/office/drawing/2014/main" id="{9F441DBB-F0AB-9D40-B35A-2A6A1ED5E0AC}"/>
+              </a:ext>
+            </a:extLst>
+          </p:cNvPr>
+          <p:cNvPicPr>
+            <a:picLocks noChangeAspect="1"/>
+          </p:cNvPicPr>
+          <p:nvPr/>
+        </p:nvPicPr>
+        <p:blipFill>
+          <a:blip r:embed="rId2"/>
+          <a:stretch>
+            <a:fillRect/>
+          </a:stretch>
+        </p:blipFill>
+        <p:spPr>
+          <a:xfrm>
+            <a:off x="1349886" y="2350591"/>
+            <a:ext cx="9492228" cy="2999173"/>
+          </a:xfrm>
+          <a:prstGeom prst="rect">
+            <a:avLst/>
+          </a:prstGeom>
+        </p:spPr>
+      </p:pic>
+    </p:spTree>
+    <p:extLst>
+      <p:ext uri="{BB962C8B-B14F-4D97-AF65-F5344CB8AC3E}">
+        <p14:creationId xmlns:p14="http://schemas.microsoft.com/office/powerpoint/2010/main" val="2663751949"/>
       </p:ext>
     </p:extLst>
   </p:cSld>
@@ -3409,111 +4405,40 @@
           <a:chExt cx="0" cy="0"/>
         </a:xfrm>
       </p:grpSpPr>
-      <p:sp>
-        <p:nvSpPr>
-          <p:cNvPr id="2" name="Title 1">
-            <a:extLst>
-              <a:ext uri="{FF2B5EF4-FFF2-40B4-BE49-F238E27FC236}">
-                <a16:creationId xmlns:a16="http://schemas.microsoft.com/office/drawing/2014/main" id="{11CCB875-B9D5-294E-99DE-9790C20BB87F}"/>
-              </a:ext>
-            </a:extLst>
-          </p:cNvPr>
-          <p:cNvSpPr>
-            <a:spLocks noGrp="1"/>
-          </p:cNvSpPr>
-          <p:nvPr>
-            <p:ph type="title"/>
-          </p:nvPr>
-        </p:nvSpPr>
-        <p:spPr/>
-        <p:txBody>
-          <a:bodyPr/>
-          <a:lstStyle/>
-          <a:p>
-            <a:r>
-              <a:rPr lang="en-US" dirty="0"/>
-              <a:t>Binary tree -- criteria</a:t>
-            </a:r>
-          </a:p>
-        </p:txBody>
-      </p:sp>
-      <p:sp>
-        <p:nvSpPr>
-          <p:cNvPr id="3" name="Content Placeholder 2">
-            <a:extLst>
-              <a:ext uri="{FF2B5EF4-FFF2-40B4-BE49-F238E27FC236}">
-                <a16:creationId xmlns:a16="http://schemas.microsoft.com/office/drawing/2014/main" id="{5396B909-2F57-4446-9777-D210FA0185A8}"/>
-              </a:ext>
-            </a:extLst>
-          </p:cNvPr>
-          <p:cNvSpPr>
-            <a:spLocks noGrp="1"/>
-          </p:cNvSpPr>
-          <p:nvPr>
-            <p:ph idx="1"/>
-          </p:nvPr>
-        </p:nvSpPr>
-        <p:spPr/>
-        <p:txBody>
-          <a:bodyPr/>
-          <a:lstStyle/>
-          <a:p>
-            <a:r>
-              <a:rPr lang="en-US" dirty="0"/>
-              <a:t>Entropy</a:t>
-            </a:r>
-          </a:p>
-          <a:p>
-            <a:r>
-              <a:rPr lang="en-US" dirty="0"/>
-              <a:t>Information gain</a:t>
-            </a:r>
-          </a:p>
-          <a:p>
-            <a:r>
-              <a:rPr lang="en-US" dirty="0"/>
-              <a:t>Gini Index</a:t>
-            </a:r>
-          </a:p>
-          <a:p>
-            <a:r>
-              <a:rPr lang="en-US" dirty="0"/>
-              <a:t>Gain ratio</a:t>
-            </a:r>
-          </a:p>
-          <a:p>
-            <a:r>
-              <a:rPr lang="en-US" dirty="0"/>
-              <a:t>Reduction in variance</a:t>
-            </a:r>
-          </a:p>
-          <a:p>
-            <a:r>
-              <a:rPr lang="en-US" dirty="0"/>
-              <a:t>Chi-Square</a:t>
-            </a:r>
-          </a:p>
-          <a:p>
-            <a:pPr lvl="1"/>
-            <a:r>
-              <a:rPr lang="en-US" dirty="0"/>
-              <a:t>CHAID (</a:t>
-            </a:r>
-            <a:r>
-              <a:rPr lang="en-US" i="1" dirty="0"/>
-              <a:t>Chi</a:t>
-            </a:r>
-            <a:r>
-              <a:rPr lang="en-US" dirty="0"/>
-              <a:t>-squared Automatic Interaction Detector)</a:t>
-            </a:r>
-          </a:p>
-        </p:txBody>
-      </p:sp>
+      <p:pic>
+        <p:nvPicPr>
+          <p:cNvPr id="2" name="Picture 1">
+            <a:extLst>
+              <a:ext uri="{FF2B5EF4-FFF2-40B4-BE49-F238E27FC236}">
+                <a16:creationId xmlns:a16="http://schemas.microsoft.com/office/drawing/2014/main" id="{8B510B78-4E67-C84C-82E5-1285FB88DB7E}"/>
+              </a:ext>
+            </a:extLst>
+          </p:cNvPr>
+          <p:cNvPicPr>
+            <a:picLocks noChangeAspect="1"/>
+          </p:cNvPicPr>
+          <p:nvPr/>
+        </p:nvPicPr>
+        <p:blipFill>
+          <a:blip r:embed="rId2"/>
+          <a:stretch>
+            <a:fillRect/>
+          </a:stretch>
+        </p:blipFill>
+        <p:spPr>
+          <a:xfrm>
+            <a:off x="330200" y="1112127"/>
+            <a:ext cx="11371232" cy="4806073"/>
+          </a:xfrm>
+          <a:prstGeom prst="rect">
+            <a:avLst/>
+          </a:prstGeom>
+        </p:spPr>
+      </p:pic>
     </p:spTree>
     <p:extLst>
       <p:ext uri="{BB962C8B-B14F-4D97-AF65-F5344CB8AC3E}">
-        <p14:creationId xmlns:p14="http://schemas.microsoft.com/office/powerpoint/2010/main" val="3505230008"/>
+        <p14:creationId xmlns:p14="http://schemas.microsoft.com/office/powerpoint/2010/main" val="2066239059"/>
       </p:ext>
     </p:extLst>
   </p:cSld>
@@ -3542,10 +4467,10 @@
       </p:grpSpPr>
       <p:pic>
         <p:nvPicPr>
-          <p:cNvPr id="3" name="Picture 2">
-            <a:extLst>
-              <a:ext uri="{FF2B5EF4-FFF2-40B4-BE49-F238E27FC236}">
-                <a16:creationId xmlns:a16="http://schemas.microsoft.com/office/drawing/2014/main" id="{16FD1929-1A9B-7346-BE9B-D84FEEF402AA}"/>
+          <p:cNvPr id="2" name="Picture 1">
+            <a:extLst>
+              <a:ext uri="{FF2B5EF4-FFF2-40B4-BE49-F238E27FC236}">
+                <a16:creationId xmlns:a16="http://schemas.microsoft.com/office/drawing/2014/main" id="{CD8F3ED2-88B9-4A47-A26B-17DB0A8F0010}"/>
               </a:ext>
             </a:extLst>
           </p:cNvPr>
@@ -3562,18 +4487,46 @@
         </p:blipFill>
         <p:spPr>
           <a:xfrm>
-            <a:off x="565150" y="323850"/>
-            <a:ext cx="11061700" cy="6210300"/>
+            <a:off x="2113631" y="1870843"/>
+            <a:ext cx="7964737" cy="4424854"/>
           </a:xfrm>
           <a:prstGeom prst="rect">
             <a:avLst/>
           </a:prstGeom>
         </p:spPr>
       </p:pic>
+      <p:sp>
+        <p:nvSpPr>
+          <p:cNvPr id="3" name="Title 2">
+            <a:extLst>
+              <a:ext uri="{FF2B5EF4-FFF2-40B4-BE49-F238E27FC236}">
+                <a16:creationId xmlns:a16="http://schemas.microsoft.com/office/drawing/2014/main" id="{2F733744-DC0D-2143-9C41-CD1738A3D42B}"/>
+              </a:ext>
+            </a:extLst>
+          </p:cNvPr>
+          <p:cNvSpPr>
+            <a:spLocks noGrp="1"/>
+          </p:cNvSpPr>
+          <p:nvPr>
+            <p:ph type="title"/>
+          </p:nvPr>
+        </p:nvSpPr>
+        <p:spPr/>
+        <p:txBody>
+          <a:bodyPr/>
+          <a:lstStyle/>
+          <a:p>
+            <a:r>
+              <a:rPr lang="en-US" dirty="0"/>
+              <a:t>An example of a tree</a:t>
+            </a:r>
+          </a:p>
+        </p:txBody>
+      </p:sp>
     </p:spTree>
     <p:extLst>
       <p:ext uri="{BB962C8B-B14F-4D97-AF65-F5344CB8AC3E}">
-        <p14:creationId xmlns:p14="http://schemas.microsoft.com/office/powerpoint/2010/main" val="3124676997"/>
+        <p14:creationId xmlns:p14="http://schemas.microsoft.com/office/powerpoint/2010/main" val="2680554534"/>
       </p:ext>
     </p:extLst>
   </p:cSld>
@@ -3605,7 +4558,7 @@
           <p:cNvPr id="2" name="Title 1">
             <a:extLst>
               <a:ext uri="{FF2B5EF4-FFF2-40B4-BE49-F238E27FC236}">
-                <a16:creationId xmlns:a16="http://schemas.microsoft.com/office/drawing/2014/main" id="{AFD9D84A-7D7D-7A4E-9A42-EFE62A1CDDFE}"/>
+                <a16:creationId xmlns:a16="http://schemas.microsoft.com/office/drawing/2014/main" id="{B8401945-42B2-6D4B-8AE7-294ABF86C1F7}"/>
               </a:ext>
             </a:extLst>
           </p:cNvPr>
@@ -3623,7 +4576,7 @@
           <a:p>
             <a:r>
               <a:rPr lang="en-US" dirty="0"/>
-              <a:t>Examine the data</a:t>
+              <a:t>Decision tree basic</a:t>
             </a:r>
           </a:p>
         </p:txBody>
@@ -3633,7 +4586,7 @@
           <p:cNvPr id="3" name="Content Placeholder 2">
             <a:extLst>
               <a:ext uri="{FF2B5EF4-FFF2-40B4-BE49-F238E27FC236}">
-                <a16:creationId xmlns:a16="http://schemas.microsoft.com/office/drawing/2014/main" id="{4DD69B43-AC93-DB44-89FF-FC4368062DEE}"/>
+                <a16:creationId xmlns:a16="http://schemas.microsoft.com/office/drawing/2014/main" id="{AACCA95E-E588-304F-ADF1-C8DC4FE7DF02}"/>
               </a:ext>
             </a:extLst>
           </p:cNvPr>
@@ -3646,65 +4599,45 @@
         </p:nvSpPr>
         <p:spPr/>
         <p:txBody>
-          <a:bodyPr>
-            <a:normAutofit/>
-          </a:bodyPr>
-          <a:lstStyle/>
-          <a:p>
-            <a:r>
-              <a:rPr lang="en-US" dirty="0"/>
-              <a:t>Prediction features</a:t>
+          <a:bodyPr/>
+          <a:lstStyle/>
+          <a:p>
+            <a:r>
+              <a:rPr lang="en-US" dirty="0"/>
+              <a:t>Select the best attribute using Attribute Selection Measures(ASM) to split the records.</a:t>
+            </a:r>
+          </a:p>
+          <a:p>
+            <a:r>
+              <a:rPr lang="en-US" dirty="0"/>
+              <a:t>Make that attribute a decision node and breaks the dataset into smaller subsets.</a:t>
+            </a:r>
+          </a:p>
+          <a:p>
+            <a:r>
+              <a:rPr lang="en-US" dirty="0"/>
+              <a:t>Starts tree building by repeating this process recursively for each child until one of the condition will match:</a:t>
             </a:r>
           </a:p>
           <a:p>
             <a:pPr lvl="1"/>
             <a:r>
               <a:rPr lang="en-US" dirty="0"/>
-              <a:t>Gender</a:t>
+              <a:t>All the tuples belong to the same attribute value.</a:t>
             </a:r>
           </a:p>
           <a:p>
             <a:pPr lvl="1"/>
             <a:r>
               <a:rPr lang="en-US" dirty="0"/>
-              <a:t>Age</a:t>
+              <a:t>There are no more remaining attributes.</a:t>
             </a:r>
           </a:p>
           <a:p>
             <a:pPr lvl="1"/>
             <a:r>
-              <a:rPr lang="en-US" dirty="0" err="1"/>
-              <a:t>Num</a:t>
-            </a:r>
-            <a:r>
-              <a:rPr lang="en-US" dirty="0"/>
-              <a:t> of sibling</a:t>
-            </a:r>
-          </a:p>
-          <a:p>
-            <a:r>
-              <a:rPr lang="en-US" dirty="0"/>
-              <a:t>Prediction outcome</a:t>
-            </a:r>
-          </a:p>
-          <a:p>
-            <a:pPr lvl="1"/>
-            <a:r>
-              <a:rPr lang="en-US" dirty="0"/>
-              <a:t>Survival (%)</a:t>
-            </a:r>
-          </a:p>
-          <a:p>
-            <a:r>
-              <a:rPr lang="en-US" dirty="0"/>
-              <a:t>Method</a:t>
-            </a:r>
-          </a:p>
-          <a:p>
-            <a:pPr lvl="1"/>
-            <a:r>
-              <a:rPr lang="en-US" dirty="0"/>
-              <a:t>Count how many samples of each class reach a given leaf </a:t>
+              <a:rPr lang="en-US" dirty="0"/>
+              <a:t>There are no more instances.</a:t>
             </a:r>
           </a:p>
           <a:p>
@@ -3715,7 +4648,7 @@
     </p:spTree>
     <p:extLst>
       <p:ext uri="{BB962C8B-B14F-4D97-AF65-F5344CB8AC3E}">
-        <p14:creationId xmlns:p14="http://schemas.microsoft.com/office/powerpoint/2010/main" val="3527479487"/>
+        <p14:creationId xmlns:p14="http://schemas.microsoft.com/office/powerpoint/2010/main" val="1090010314"/>
       </p:ext>
     </p:extLst>
   </p:cSld>
@@ -3747,7 +4680,7 @@
           <p:cNvPr id="2" name="Title 1">
             <a:extLst>
               <a:ext uri="{FF2B5EF4-FFF2-40B4-BE49-F238E27FC236}">
-                <a16:creationId xmlns:a16="http://schemas.microsoft.com/office/drawing/2014/main" id="{AB85EEDA-C853-2944-BAA7-5F83281F0C81}"/>
+                <a16:creationId xmlns:a16="http://schemas.microsoft.com/office/drawing/2014/main" id="{3D8264CB-6FD4-9D4D-8B30-B24E138B8A4F}"/>
               </a:ext>
             </a:extLst>
           </p:cNvPr>
@@ -3763,7 +4696,10 @@
           <a:bodyPr/>
           <a:lstStyle/>
           <a:p>
-            <a:endParaRPr lang="en-US"/>
+            <a:r>
+              <a:rPr lang="en-US" dirty="0"/>
+              <a:t>Basic terminologies</a:t>
+            </a:r>
           </a:p>
         </p:txBody>
       </p:sp>
@@ -3772,7 +4708,7 @@
           <p:cNvPr id="3" name="Content Placeholder 2">
             <a:extLst>
               <a:ext uri="{FF2B5EF4-FFF2-40B4-BE49-F238E27FC236}">
-                <a16:creationId xmlns:a16="http://schemas.microsoft.com/office/drawing/2014/main" id="{A8E96563-E860-2C4E-85F9-EB945949B09E}"/>
+                <a16:creationId xmlns:a16="http://schemas.microsoft.com/office/drawing/2014/main" id="{632770DA-4582-AC42-A7FA-FAA0602D1902}"/>
               </a:ext>
             </a:extLst>
           </p:cNvPr>
@@ -3785,29 +4721,86 @@
         </p:nvSpPr>
         <p:spPr/>
         <p:txBody>
-          <a:bodyPr/>
-          <a:lstStyle/>
-          <a:p>
-            <a:r>
-              <a:rPr lang="en-US" dirty="0"/>
-              <a:t>For example, for the leaf corresponding to the decision [ Female, Age &lt;9, sibling &lt;2.9]</a:t>
-            </a:r>
-          </a:p>
-          <a:p>
-            <a:r>
-              <a:rPr lang="en-US" dirty="0"/>
-              <a:t>it was observed that in 73% of cases, the sample reaching this leaf was a person 'Not survived’ and in 27% of the cases, it was a person survived. </a:t>
-            </a:r>
-          </a:p>
-          <a:p>
-            <a:endParaRPr lang="en-US" dirty="0"/>
+          <a:bodyPr>
+            <a:normAutofit fontScale="85000" lnSpcReduction="20000"/>
+          </a:bodyPr>
+          <a:lstStyle/>
+          <a:p>
+            <a:r>
+              <a:rPr lang="en-US" b="1" dirty="0"/>
+              <a:t>Root Node (Top Decision Node): </a:t>
+            </a:r>
+            <a:r>
+              <a:rPr lang="en-US" dirty="0"/>
+              <a:t>It represents the entire population or sample and this further gets divided into two or more homogeneous sets.</a:t>
+            </a:r>
+          </a:p>
+          <a:p>
+            <a:r>
+              <a:rPr lang="en-US" b="1" dirty="0"/>
+              <a:t>Splitting: </a:t>
+            </a:r>
+            <a:r>
+              <a:rPr lang="en-US" dirty="0"/>
+              <a:t>It is a process of dividing a node into two or more sub-nodes.</a:t>
+            </a:r>
+          </a:p>
+          <a:p>
+            <a:r>
+              <a:rPr lang="en-US" b="1" dirty="0"/>
+              <a:t>Decision Node: </a:t>
+            </a:r>
+            <a:r>
+              <a:rPr lang="en-US" dirty="0"/>
+              <a:t>When a sub-node splits into further sub-nodes, then it is called a decision node.</a:t>
+            </a:r>
+          </a:p>
+          <a:p>
+            <a:r>
+              <a:rPr lang="en-US" b="1" dirty="0"/>
+              <a:t>Leaf/ Terminal Node: </a:t>
+            </a:r>
+            <a:r>
+              <a:rPr lang="en-US" dirty="0"/>
+              <a:t>Nodes with no children (no further split) is called Leaf or Terminal node.</a:t>
+            </a:r>
+          </a:p>
+          <a:p>
+            <a:r>
+              <a:rPr lang="en-US" b="1" dirty="0"/>
+              <a:t>Pruning: </a:t>
+            </a:r>
+            <a:r>
+              <a:rPr lang="en-US" dirty="0"/>
+              <a:t>When we reduce the size of decision trees by removing nodes (opposite of Splitting), the process is called pruning.</a:t>
+            </a:r>
+          </a:p>
+          <a:p>
+            <a:r>
+              <a:rPr lang="en-US" b="1" dirty="0"/>
+              <a:t>Branch / Sub-Tree: </a:t>
+            </a:r>
+            <a:r>
+              <a:rPr lang="en-US" dirty="0"/>
+              <a:t>A sub section of the decision tree is called branch or sub-tree.</a:t>
+            </a:r>
+          </a:p>
+          <a:p>
+            <a:r>
+              <a:rPr lang="en-US" b="1" dirty="0"/>
+              <a:t>Parent and Child Node: </a:t>
+            </a:r>
+            <a:r>
+              <a:rPr lang="en-US" dirty="0"/>
+              <a:t>A node, which is divided into sub-nodes is called a parent node of sub-nodes whereas sub-nodes are the child of a parent node.</a:t>
+            </a:r>
           </a:p>
         </p:txBody>
       </p:sp>
     </p:spTree>
     <p:extLst>
       <p:ext uri="{BB962C8B-B14F-4D97-AF65-F5344CB8AC3E}">
-        <p14:creationId xmlns:p14="http://schemas.microsoft.com/office/powerpoint/2010/main" val="1637291432"/>
+        <p14:creationId xmlns:p14="http://schemas.microsoft.com/office/powerpoint/2010/main" val="4208813240"/>
       </p:ext>
     </p:extLst>
   </p:cSld>
@@ -3839,7 +4832,7 @@
           <p:cNvPr id="2" name="Title 1">
             <a:extLst>
               <a:ext uri="{FF2B5EF4-FFF2-40B4-BE49-F238E27FC236}">
-                <a16:creationId xmlns:a16="http://schemas.microsoft.com/office/drawing/2014/main" id="{2E8BB92C-021A-C542-B352-892081A2781D}"/>
+                <a16:creationId xmlns:a16="http://schemas.microsoft.com/office/drawing/2014/main" id="{11CCB875-B9D5-294E-99DE-9790C20BB87F}"/>
               </a:ext>
             </a:extLst>
           </p:cNvPr>
@@ -3855,7 +4848,10 @@
           <a:bodyPr/>
           <a:lstStyle/>
           <a:p>
-            <a:endParaRPr lang="en-US"/>
+            <a:r>
+              <a:rPr lang="en-US" dirty="0"/>
+              <a:t>Binary tree -- criteria</a:t>
+            </a:r>
           </a:p>
         </p:txBody>
       </p:sp>
@@ -3864,7 +4860,7 @@
           <p:cNvPr id="3" name="Content Placeholder 2">
             <a:extLst>
               <a:ext uri="{FF2B5EF4-FFF2-40B4-BE49-F238E27FC236}">
-                <a16:creationId xmlns:a16="http://schemas.microsoft.com/office/drawing/2014/main" id="{1D9296A9-874B-744D-8799-09C0F98E35DC}"/>
+                <a16:creationId xmlns:a16="http://schemas.microsoft.com/office/drawing/2014/main" id="{5396B909-2F57-4446-9777-D210FA0185A8}"/>
               </a:ext>
             </a:extLst>
           </p:cNvPr>
@@ -3882,30 +4878,387 @@
           <a:p>
             <a:r>
               <a:rPr lang="en-US" dirty="0"/>
-              <a:t>The decision tree consists of nodes that </a:t>
-            </a:r>
-          </a:p>
-          <a:p>
-            <a:r>
-              <a:rPr lang="en-US" dirty="0"/>
-              <a:t>use one of the entries of the decision vector </a:t>
-            </a:r>
-          </a:p>
-          <a:p>
-            <a:r>
-              <a:rPr lang="en-US"/>
-              <a:t>and applies a threshold</a:t>
-            </a:r>
-          </a:p>
-          <a:p>
-            <a:endParaRPr lang="en-US" dirty="0"/>
+              <a:t>Entropy</a:t>
+            </a:r>
+          </a:p>
+          <a:p>
+            <a:r>
+              <a:rPr lang="en-US" dirty="0"/>
+              <a:t>Information gain</a:t>
+            </a:r>
+          </a:p>
+          <a:p>
+            <a:r>
+              <a:rPr lang="en-US" dirty="0"/>
+              <a:t>Gini Index</a:t>
+            </a:r>
+          </a:p>
+          <a:p>
+            <a:r>
+              <a:rPr lang="en-US" dirty="0"/>
+              <a:t>Gain ratio</a:t>
+            </a:r>
+          </a:p>
+          <a:p>
+            <a:r>
+              <a:rPr lang="en-US" dirty="0"/>
+              <a:t>Reduction in variance</a:t>
+            </a:r>
+          </a:p>
+          <a:p>
+            <a:r>
+              <a:rPr lang="en-US" dirty="0"/>
+              <a:t>Chi-Square</a:t>
+            </a:r>
+          </a:p>
+          <a:p>
+            <a:pPr lvl="1"/>
+            <a:r>
+              <a:rPr lang="en-US" dirty="0"/>
+              <a:t>CHAID (</a:t>
+            </a:r>
+            <a:r>
+              <a:rPr lang="en-US" i="1" dirty="0"/>
+              <a:t>Chi</a:t>
+            </a:r>
+            <a:r>
+              <a:rPr lang="en-US" dirty="0"/>
+              <a:t>-squared Automatic Interaction Detector)</a:t>
+            </a:r>
           </a:p>
         </p:txBody>
       </p:sp>
     </p:spTree>
     <p:extLst>
       <p:ext uri="{BB962C8B-B14F-4D97-AF65-F5344CB8AC3E}">
-        <p14:creationId xmlns:p14="http://schemas.microsoft.com/office/powerpoint/2010/main" val="4191807013"/>
+        <p14:creationId xmlns:p14="http://schemas.microsoft.com/office/powerpoint/2010/main" val="3505230008"/>
+      </p:ext>
+    </p:extLst>
+  </p:cSld>
+  <p:clrMapOvr>
+    <a:masterClrMapping/>
+  </p:clrMapOvr>
+</p:sld>
+</file>
+
+<file path=ppt/slides/slide7.xml><?xml version="1.0" encoding="utf-8"?>
+<p:sld xmlns:a="http://schemas.openxmlformats.org/drawingml/2006/main" xmlns:r="http://schemas.openxmlformats.org/officeDocument/2006/relationships" xmlns:p="http://schemas.openxmlformats.org/presentationml/2006/main">
+  <p:cSld>
+    <p:spTree>
+      <p:nvGrpSpPr>
+        <p:cNvPr id="1" name=""/>
+        <p:cNvGrpSpPr/>
+        <p:nvPr/>
+      </p:nvGrpSpPr>
+      <p:grpSpPr>
+        <a:xfrm>
+          <a:off x="0" y="0"/>
+          <a:ext cx="0" cy="0"/>
+          <a:chOff x="0" y="0"/>
+          <a:chExt cx="0" cy="0"/>
+        </a:xfrm>
+      </p:grpSpPr>
+      <p:sp>
+        <p:nvSpPr>
+          <p:cNvPr id="2" name="Title 1">
+            <a:extLst>
+              <a:ext uri="{FF2B5EF4-FFF2-40B4-BE49-F238E27FC236}">
+                <a16:creationId xmlns:a16="http://schemas.microsoft.com/office/drawing/2014/main" id="{99DE39C2-C292-F64F-AEAA-27A81877135E}"/>
+              </a:ext>
+            </a:extLst>
+          </p:cNvPr>
+          <p:cNvSpPr>
+            <a:spLocks noGrp="1"/>
+          </p:cNvSpPr>
+          <p:nvPr>
+            <p:ph type="ctrTitle"/>
+          </p:nvPr>
+        </p:nvSpPr>
+        <p:spPr/>
+        <p:txBody>
+          <a:bodyPr/>
+          <a:lstStyle/>
+          <a:p>
+            <a:r>
+              <a:rPr lang="en-US" dirty="0"/>
+              <a:t>Our homework problem</a:t>
+            </a:r>
+          </a:p>
+        </p:txBody>
+      </p:sp>
+      <p:sp>
+        <p:nvSpPr>
+          <p:cNvPr id="3" name="Text Placeholder 2">
+            <a:extLst>
+              <a:ext uri="{FF2B5EF4-FFF2-40B4-BE49-F238E27FC236}">
+                <a16:creationId xmlns:a16="http://schemas.microsoft.com/office/drawing/2014/main" id="{63B5F603-CA8C-C346-AA70-F289301119BE}"/>
+              </a:ext>
+            </a:extLst>
+          </p:cNvPr>
+          <p:cNvSpPr>
+            <a:spLocks noGrp="1"/>
+          </p:cNvSpPr>
+          <p:nvPr>
+            <p:ph type="subTitle" idx="1"/>
+          </p:nvPr>
+        </p:nvSpPr>
+        <p:spPr/>
+        <p:txBody>
+          <a:bodyPr/>
+          <a:lstStyle/>
+          <a:p>
+            <a:r>
+              <a:rPr lang="en-US" dirty="0"/>
+              <a:t>11062020</a:t>
+            </a:r>
+          </a:p>
+        </p:txBody>
+      </p:sp>
+    </p:spTree>
+    <p:extLst>
+      <p:ext uri="{BB962C8B-B14F-4D97-AF65-F5344CB8AC3E}">
+        <p14:creationId xmlns:p14="http://schemas.microsoft.com/office/powerpoint/2010/main" val="2349103487"/>
+      </p:ext>
+    </p:extLst>
+  </p:cSld>
+  <p:clrMapOvr>
+    <a:masterClrMapping/>
+  </p:clrMapOvr>
+</p:sld>
+</file>
+
+<file path=ppt/slides/slide8.xml><?xml version="1.0" encoding="utf-8"?>
+<p:sld xmlns:a="http://schemas.openxmlformats.org/drawingml/2006/main" xmlns:r="http://schemas.openxmlformats.org/officeDocument/2006/relationships" xmlns:p="http://schemas.openxmlformats.org/presentationml/2006/main">
+  <p:cSld>
+    <p:spTree>
+      <p:nvGrpSpPr>
+        <p:cNvPr id="1" name=""/>
+        <p:cNvGrpSpPr/>
+        <p:nvPr/>
+      </p:nvGrpSpPr>
+      <p:grpSpPr>
+        <a:xfrm>
+          <a:off x="0" y="0"/>
+          <a:ext cx="0" cy="0"/>
+          <a:chOff x="0" y="0"/>
+          <a:chExt cx="0" cy="0"/>
+        </a:xfrm>
+      </p:grpSpPr>
+      <p:pic>
+        <p:nvPicPr>
+          <p:cNvPr id="3" name="Picture 2">
+            <a:extLst>
+              <a:ext uri="{FF2B5EF4-FFF2-40B4-BE49-F238E27FC236}">
+                <a16:creationId xmlns:a16="http://schemas.microsoft.com/office/drawing/2014/main" id="{16FD1929-1A9B-7346-BE9B-D84FEEF402AA}"/>
+              </a:ext>
+            </a:extLst>
+          </p:cNvPr>
+          <p:cNvPicPr>
+            <a:picLocks noChangeAspect="1"/>
+          </p:cNvPicPr>
+          <p:nvPr/>
+        </p:nvPicPr>
+        <p:blipFill>
+          <a:blip r:embed="rId2"/>
+          <a:stretch>
+            <a:fillRect/>
+          </a:stretch>
+        </p:blipFill>
+        <p:spPr>
+          <a:xfrm>
+            <a:off x="1387906" y="1571530"/>
+            <a:ext cx="9416188" cy="5286470"/>
+          </a:xfrm>
+          <a:prstGeom prst="rect">
+            <a:avLst/>
+          </a:prstGeom>
+        </p:spPr>
+      </p:pic>
+      <p:sp>
+        <p:nvSpPr>
+          <p:cNvPr id="4" name="Title 3">
+            <a:extLst>
+              <a:ext uri="{FF2B5EF4-FFF2-40B4-BE49-F238E27FC236}">
+                <a16:creationId xmlns:a16="http://schemas.microsoft.com/office/drawing/2014/main" id="{FCA2A36D-A4D2-C147-B7DB-912EA1F06409}"/>
+              </a:ext>
+            </a:extLst>
+          </p:cNvPr>
+          <p:cNvSpPr>
+            <a:spLocks noGrp="1"/>
+          </p:cNvSpPr>
+          <p:nvPr>
+            <p:ph type="title"/>
+          </p:nvPr>
+        </p:nvSpPr>
+        <p:spPr/>
+        <p:txBody>
+          <a:bodyPr/>
+          <a:lstStyle/>
+          <a:p>
+            <a:r>
+              <a:rPr lang="en-US" dirty="0"/>
+              <a:t>Proposed tree structure</a:t>
+            </a:r>
+          </a:p>
+        </p:txBody>
+      </p:sp>
+    </p:spTree>
+    <p:extLst>
+      <p:ext uri="{BB962C8B-B14F-4D97-AF65-F5344CB8AC3E}">
+        <p14:creationId xmlns:p14="http://schemas.microsoft.com/office/powerpoint/2010/main" val="3124676997"/>
+      </p:ext>
+    </p:extLst>
+  </p:cSld>
+  <p:clrMapOvr>
+    <a:masterClrMapping/>
+  </p:clrMapOvr>
+</p:sld>
+</file>
+
+<file path=ppt/slides/slide9.xml><?xml version="1.0" encoding="utf-8"?>
+<p:sld xmlns:a="http://schemas.openxmlformats.org/drawingml/2006/main" xmlns:r="http://schemas.openxmlformats.org/officeDocument/2006/relationships" xmlns:p="http://schemas.openxmlformats.org/presentationml/2006/main">
+  <p:cSld>
+    <p:spTree>
+      <p:nvGrpSpPr>
+        <p:cNvPr id="1" name=""/>
+        <p:cNvGrpSpPr/>
+        <p:nvPr/>
+      </p:nvGrpSpPr>
+      <p:grpSpPr>
+        <a:xfrm>
+          <a:off x="0" y="0"/>
+          <a:ext cx="0" cy="0"/>
+          <a:chOff x="0" y="0"/>
+          <a:chExt cx="0" cy="0"/>
+        </a:xfrm>
+      </p:grpSpPr>
+      <p:sp>
+        <p:nvSpPr>
+          <p:cNvPr id="2" name="Title 1">
+            <a:extLst>
+              <a:ext uri="{FF2B5EF4-FFF2-40B4-BE49-F238E27FC236}">
+                <a16:creationId xmlns:a16="http://schemas.microsoft.com/office/drawing/2014/main" id="{AB85EEDA-C853-2944-BAA7-5F83281F0C81}"/>
+              </a:ext>
+            </a:extLst>
+          </p:cNvPr>
+          <p:cNvSpPr>
+            <a:spLocks noGrp="1"/>
+          </p:cNvSpPr>
+          <p:nvPr>
+            <p:ph type="title"/>
+          </p:nvPr>
+        </p:nvSpPr>
+        <p:spPr/>
+        <p:txBody>
+          <a:bodyPr/>
+          <a:lstStyle/>
+          <a:p>
+            <a:r>
+              <a:rPr lang="en-US" dirty="0"/>
+              <a:t>An example in the home work</a:t>
+            </a:r>
+          </a:p>
+        </p:txBody>
+      </p:sp>
+      <p:sp>
+        <p:nvSpPr>
+          <p:cNvPr id="3" name="Content Placeholder 2">
+            <a:extLst>
+              <a:ext uri="{FF2B5EF4-FFF2-40B4-BE49-F238E27FC236}">
+                <a16:creationId xmlns:a16="http://schemas.microsoft.com/office/drawing/2014/main" id="{A8E96563-E860-2C4E-85F9-EB945949B09E}"/>
+              </a:ext>
+            </a:extLst>
+          </p:cNvPr>
+          <p:cNvSpPr>
+            <a:spLocks noGrp="1"/>
+          </p:cNvSpPr>
+          <p:nvPr>
+            <p:ph idx="1"/>
+          </p:nvPr>
+        </p:nvSpPr>
+        <p:spPr>
+          <a:xfrm>
+            <a:off x="731564" y="4095859"/>
+            <a:ext cx="10515600" cy="2546678"/>
+          </a:xfrm>
+        </p:spPr>
+        <p:txBody>
+          <a:bodyPr/>
+          <a:lstStyle/>
+          <a:p>
+            <a:r>
+              <a:rPr lang="en-US" dirty="0"/>
+              <a:t>For example, for the leaf corresponding to the decision [ Female, Age &lt;9, sibling &lt;2.9] </a:t>
+            </a:r>
+          </a:p>
+          <a:p>
+            <a:pPr lvl="1"/>
+            <a:r>
+              <a:rPr lang="en-US" dirty="0"/>
+              <a:t>Could be “arbitrary” but not in this example?</a:t>
+            </a:r>
+          </a:p>
+          <a:p>
+            <a:r>
+              <a:rPr lang="en-US" dirty="0"/>
+              <a:t>It was observed that in “</a:t>
+            </a:r>
+            <a:r>
+              <a:rPr lang="en-US" b="1" dirty="0">
+                <a:solidFill>
+                  <a:srgbClr val="FF0000"/>
+                </a:solidFill>
+              </a:rPr>
+              <a:t>73% </a:t>
+            </a:r>
+            <a:r>
+              <a:rPr lang="en-US" b="1" dirty="0"/>
+              <a:t>of cases”</a:t>
+            </a:r>
+            <a:r>
+              <a:rPr lang="en-US" dirty="0"/>
+              <a:t>, the sample reaching this leaf was a person 'Not survived’ and in 27% of the cases, it was a person survived. </a:t>
+            </a:r>
+          </a:p>
+          <a:p>
+            <a:endParaRPr lang="en-US" dirty="0"/>
+          </a:p>
+        </p:txBody>
+      </p:sp>
+      <p:pic>
+        <p:nvPicPr>
+          <p:cNvPr id="5" name="Picture 4">
+            <a:extLst>
+              <a:ext uri="{FF2B5EF4-FFF2-40B4-BE49-F238E27FC236}">
+                <a16:creationId xmlns:a16="http://schemas.microsoft.com/office/drawing/2014/main" id="{DE60AB97-D09C-2C4A-9271-CFF39455BD90}"/>
+              </a:ext>
+            </a:extLst>
+          </p:cNvPr>
+          <p:cNvPicPr>
+            <a:picLocks noChangeAspect="1"/>
+          </p:cNvPicPr>
+          <p:nvPr/>
+        </p:nvPicPr>
+        <p:blipFill>
+          <a:blip r:embed="rId2"/>
+          <a:stretch>
+            <a:fillRect/>
+          </a:stretch>
+        </p:blipFill>
+        <p:spPr>
+          <a:xfrm>
+            <a:off x="624928" y="1566041"/>
+            <a:ext cx="10728872" cy="2363040"/>
+          </a:xfrm>
+          <a:prstGeom prst="rect">
+            <a:avLst/>
+          </a:prstGeom>
+        </p:spPr>
+      </p:pic>
+    </p:spTree>
+    <p:extLst>
+      <p:ext uri="{BB962C8B-B14F-4D97-AF65-F5344CB8AC3E}">
+        <p14:creationId xmlns:p14="http://schemas.microsoft.com/office/powerpoint/2010/main" val="1637291432"/>
       </p:ext>
     </p:extLst>
   </p:cSld>

</xml_diff>

<commit_message>
should the end of today
</commit_message>
<xml_diff>
--- a/doc/meeting_11052020.pptx
+++ b/doc/meeting_11052020.pptx
@@ -11,17 +11,19 @@
     <p:sldId id="262" r:id="rId5"/>
     <p:sldId id="264" r:id="rId6"/>
     <p:sldId id="257" r:id="rId7"/>
-    <p:sldId id="267" r:id="rId8"/>
-    <p:sldId id="258" r:id="rId9"/>
-    <p:sldId id="260" r:id="rId10"/>
-    <p:sldId id="266" r:id="rId11"/>
-    <p:sldId id="265" r:id="rId12"/>
-    <p:sldId id="259" r:id="rId13"/>
-    <p:sldId id="261" r:id="rId14"/>
-    <p:sldId id="269" r:id="rId15"/>
-    <p:sldId id="272" r:id="rId16"/>
-    <p:sldId id="270" r:id="rId17"/>
-    <p:sldId id="271" r:id="rId18"/>
+    <p:sldId id="273" r:id="rId8"/>
+    <p:sldId id="274" r:id="rId9"/>
+    <p:sldId id="267" r:id="rId10"/>
+    <p:sldId id="258" r:id="rId11"/>
+    <p:sldId id="260" r:id="rId12"/>
+    <p:sldId id="266" r:id="rId13"/>
+    <p:sldId id="265" r:id="rId14"/>
+    <p:sldId id="259" r:id="rId15"/>
+    <p:sldId id="261" r:id="rId16"/>
+    <p:sldId id="269" r:id="rId17"/>
+    <p:sldId id="272" r:id="rId18"/>
+    <p:sldId id="270" r:id="rId19"/>
+    <p:sldId id="271" r:id="rId20"/>
   </p:sldIdLst>
   <p:sldSz cx="12192000" cy="6858000"/>
   <p:notesSz cx="6858000" cy="9144000"/>
@@ -120,6 +122,11 @@
       </a:defRPr>
     </a:lvl9pPr>
   </p:defaultTextStyle>
+  <p:extLst>
+    <p:ext uri="{EFAFB233-063F-42B5-8137-9DF3F51BA10A}">
+      <p15:sldGuideLst xmlns:p15="http://schemas.microsoft.com/office/powerpoint/2012/main"/>
+    </p:ext>
+  </p:extLst>
 </p:presentation>
 </file>
 
@@ -270,7 +277,7 @@
           <a:p>
             <a:fld id="{943B0EBA-9129-C045-8382-01D6E32D50B5}" type="datetimeFigureOut">
               <a:rPr lang="en-US" smtClean="0"/>
-              <a:t>11/4/20</a:t>
+              <a:t>11/5/20</a:t>
             </a:fld>
             <a:endParaRPr lang="en-US"/>
           </a:p>
@@ -468,7 +475,7 @@
           <a:p>
             <a:fld id="{943B0EBA-9129-C045-8382-01D6E32D50B5}" type="datetimeFigureOut">
               <a:rPr lang="en-US" smtClean="0"/>
-              <a:t>11/4/20</a:t>
+              <a:t>11/5/20</a:t>
             </a:fld>
             <a:endParaRPr lang="en-US"/>
           </a:p>
@@ -676,7 +683,7 @@
           <a:p>
             <a:fld id="{943B0EBA-9129-C045-8382-01D6E32D50B5}" type="datetimeFigureOut">
               <a:rPr lang="en-US" smtClean="0"/>
-              <a:t>11/4/20</a:t>
+              <a:t>11/5/20</a:t>
             </a:fld>
             <a:endParaRPr lang="en-US"/>
           </a:p>
@@ -874,7 +881,7 @@
           <a:p>
             <a:fld id="{943B0EBA-9129-C045-8382-01D6E32D50B5}" type="datetimeFigureOut">
               <a:rPr lang="en-US" smtClean="0"/>
-              <a:t>11/4/20</a:t>
+              <a:t>11/5/20</a:t>
             </a:fld>
             <a:endParaRPr lang="en-US"/>
           </a:p>
@@ -1149,7 +1156,7 @@
           <a:p>
             <a:fld id="{943B0EBA-9129-C045-8382-01D6E32D50B5}" type="datetimeFigureOut">
               <a:rPr lang="en-US" smtClean="0"/>
-              <a:t>11/4/20</a:t>
+              <a:t>11/5/20</a:t>
             </a:fld>
             <a:endParaRPr lang="en-US"/>
           </a:p>
@@ -1414,7 +1421,7 @@
           <a:p>
             <a:fld id="{943B0EBA-9129-C045-8382-01D6E32D50B5}" type="datetimeFigureOut">
               <a:rPr lang="en-US" smtClean="0"/>
-              <a:t>11/4/20</a:t>
+              <a:t>11/5/20</a:t>
             </a:fld>
             <a:endParaRPr lang="en-US"/>
           </a:p>
@@ -1826,7 +1833,7 @@
           <a:p>
             <a:fld id="{943B0EBA-9129-C045-8382-01D6E32D50B5}" type="datetimeFigureOut">
               <a:rPr lang="en-US" smtClean="0"/>
-              <a:t>11/4/20</a:t>
+              <a:t>11/5/20</a:t>
             </a:fld>
             <a:endParaRPr lang="en-US"/>
           </a:p>
@@ -1967,7 +1974,7 @@
           <a:p>
             <a:fld id="{943B0EBA-9129-C045-8382-01D6E32D50B5}" type="datetimeFigureOut">
               <a:rPr lang="en-US" smtClean="0"/>
-              <a:t>11/4/20</a:t>
+              <a:t>11/5/20</a:t>
             </a:fld>
             <a:endParaRPr lang="en-US"/>
           </a:p>
@@ -2080,7 +2087,7 @@
           <a:p>
             <a:fld id="{943B0EBA-9129-C045-8382-01D6E32D50B5}" type="datetimeFigureOut">
               <a:rPr lang="en-US" smtClean="0"/>
-              <a:t>11/4/20</a:t>
+              <a:t>11/5/20</a:t>
             </a:fld>
             <a:endParaRPr lang="en-US"/>
           </a:p>
@@ -2391,7 +2398,7 @@
           <a:p>
             <a:fld id="{943B0EBA-9129-C045-8382-01D6E32D50B5}" type="datetimeFigureOut">
               <a:rPr lang="en-US" smtClean="0"/>
-              <a:t>11/4/20</a:t>
+              <a:t>11/5/20</a:t>
             </a:fld>
             <a:endParaRPr lang="en-US"/>
           </a:p>
@@ -2679,7 +2686,7 @@
           <a:p>
             <a:fld id="{943B0EBA-9129-C045-8382-01D6E32D50B5}" type="datetimeFigureOut">
               <a:rPr lang="en-US" smtClean="0"/>
-              <a:t>11/4/20</a:t>
+              <a:t>11/5/20</a:t>
             </a:fld>
             <a:endParaRPr lang="en-US"/>
           </a:p>
@@ -2920,7 +2927,7 @@
           <a:p>
             <a:fld id="{943B0EBA-9129-C045-8382-01D6E32D50B5}" type="datetimeFigureOut">
               <a:rPr lang="en-US" smtClean="0"/>
-              <a:t>11/4/20</a:t>
+              <a:t>11/5/20</a:t>
             </a:fld>
             <a:endParaRPr lang="en-US"/>
           </a:p>
@@ -3423,6 +3430,247 @@
           <a:chExt cx="0" cy="0"/>
         </a:xfrm>
       </p:grpSpPr>
+      <p:pic>
+        <p:nvPicPr>
+          <p:cNvPr id="3" name="Picture 2">
+            <a:extLst>
+              <a:ext uri="{FF2B5EF4-FFF2-40B4-BE49-F238E27FC236}">
+                <a16:creationId xmlns:a16="http://schemas.microsoft.com/office/drawing/2014/main" id="{16FD1929-1A9B-7346-BE9B-D84FEEF402AA}"/>
+              </a:ext>
+            </a:extLst>
+          </p:cNvPr>
+          <p:cNvPicPr>
+            <a:picLocks noChangeAspect="1"/>
+          </p:cNvPicPr>
+          <p:nvPr/>
+        </p:nvPicPr>
+        <p:blipFill>
+          <a:blip r:embed="rId2"/>
+          <a:stretch>
+            <a:fillRect/>
+          </a:stretch>
+        </p:blipFill>
+        <p:spPr>
+          <a:xfrm>
+            <a:off x="1387906" y="1571530"/>
+            <a:ext cx="9416188" cy="5286470"/>
+          </a:xfrm>
+          <a:prstGeom prst="rect">
+            <a:avLst/>
+          </a:prstGeom>
+        </p:spPr>
+      </p:pic>
+      <p:sp>
+        <p:nvSpPr>
+          <p:cNvPr id="4" name="Title 3">
+            <a:extLst>
+              <a:ext uri="{FF2B5EF4-FFF2-40B4-BE49-F238E27FC236}">
+                <a16:creationId xmlns:a16="http://schemas.microsoft.com/office/drawing/2014/main" id="{FCA2A36D-A4D2-C147-B7DB-912EA1F06409}"/>
+              </a:ext>
+            </a:extLst>
+          </p:cNvPr>
+          <p:cNvSpPr>
+            <a:spLocks noGrp="1"/>
+          </p:cNvSpPr>
+          <p:nvPr>
+            <p:ph type="title"/>
+          </p:nvPr>
+        </p:nvSpPr>
+        <p:spPr/>
+        <p:txBody>
+          <a:bodyPr/>
+          <a:lstStyle/>
+          <a:p>
+            <a:r>
+              <a:rPr lang="en-US" dirty="0"/>
+              <a:t>Proposed tree structure</a:t>
+            </a:r>
+          </a:p>
+        </p:txBody>
+      </p:sp>
+    </p:spTree>
+    <p:extLst>
+      <p:ext uri="{BB962C8B-B14F-4D97-AF65-F5344CB8AC3E}">
+        <p14:creationId xmlns:p14="http://schemas.microsoft.com/office/powerpoint/2010/main" val="3124676997"/>
+      </p:ext>
+    </p:extLst>
+  </p:cSld>
+  <p:clrMapOvr>
+    <a:masterClrMapping/>
+  </p:clrMapOvr>
+</p:sld>
+</file>
+
+<file path=ppt/slides/slide11.xml><?xml version="1.0" encoding="utf-8"?>
+<p:sld xmlns:a="http://schemas.openxmlformats.org/drawingml/2006/main" xmlns:r="http://schemas.openxmlformats.org/officeDocument/2006/relationships" xmlns:p="http://schemas.openxmlformats.org/presentationml/2006/main">
+  <p:cSld>
+    <p:spTree>
+      <p:nvGrpSpPr>
+        <p:cNvPr id="1" name=""/>
+        <p:cNvGrpSpPr/>
+        <p:nvPr/>
+      </p:nvGrpSpPr>
+      <p:grpSpPr>
+        <a:xfrm>
+          <a:off x="0" y="0"/>
+          <a:ext cx="0" cy="0"/>
+          <a:chOff x="0" y="0"/>
+          <a:chExt cx="0" cy="0"/>
+        </a:xfrm>
+      </p:grpSpPr>
+      <p:sp>
+        <p:nvSpPr>
+          <p:cNvPr id="2" name="Title 1">
+            <a:extLst>
+              <a:ext uri="{FF2B5EF4-FFF2-40B4-BE49-F238E27FC236}">
+                <a16:creationId xmlns:a16="http://schemas.microsoft.com/office/drawing/2014/main" id="{AB85EEDA-C853-2944-BAA7-5F83281F0C81}"/>
+              </a:ext>
+            </a:extLst>
+          </p:cNvPr>
+          <p:cNvSpPr>
+            <a:spLocks noGrp="1"/>
+          </p:cNvSpPr>
+          <p:nvPr>
+            <p:ph type="title"/>
+          </p:nvPr>
+        </p:nvSpPr>
+        <p:spPr/>
+        <p:txBody>
+          <a:bodyPr/>
+          <a:lstStyle/>
+          <a:p>
+            <a:r>
+              <a:rPr lang="en-US" dirty="0"/>
+              <a:t>An example in the home work</a:t>
+            </a:r>
+          </a:p>
+        </p:txBody>
+      </p:sp>
+      <p:sp>
+        <p:nvSpPr>
+          <p:cNvPr id="3" name="Content Placeholder 2">
+            <a:extLst>
+              <a:ext uri="{FF2B5EF4-FFF2-40B4-BE49-F238E27FC236}">
+                <a16:creationId xmlns:a16="http://schemas.microsoft.com/office/drawing/2014/main" id="{A8E96563-E860-2C4E-85F9-EB945949B09E}"/>
+              </a:ext>
+            </a:extLst>
+          </p:cNvPr>
+          <p:cNvSpPr>
+            <a:spLocks noGrp="1"/>
+          </p:cNvSpPr>
+          <p:nvPr>
+            <p:ph idx="1"/>
+          </p:nvPr>
+        </p:nvSpPr>
+        <p:spPr>
+          <a:xfrm>
+            <a:off x="731564" y="4095859"/>
+            <a:ext cx="10515600" cy="2546678"/>
+          </a:xfrm>
+        </p:spPr>
+        <p:txBody>
+          <a:bodyPr/>
+          <a:lstStyle/>
+          <a:p>
+            <a:r>
+              <a:rPr lang="en-US" dirty="0"/>
+              <a:t>For example, for the leaf corresponding to the decision [ Female, Age &lt;9, sibling &lt;2.9] </a:t>
+            </a:r>
+          </a:p>
+          <a:p>
+            <a:pPr lvl="1"/>
+            <a:r>
+              <a:rPr lang="en-US" dirty="0"/>
+              <a:t>Could be “arbitrary” but not in this example?</a:t>
+            </a:r>
+          </a:p>
+          <a:p>
+            <a:r>
+              <a:rPr lang="en-US" dirty="0"/>
+              <a:t>It was observed that in “</a:t>
+            </a:r>
+            <a:r>
+              <a:rPr lang="en-US" b="1" dirty="0">
+                <a:solidFill>
+                  <a:srgbClr val="FF0000"/>
+                </a:solidFill>
+              </a:rPr>
+              <a:t>73% </a:t>
+            </a:r>
+            <a:r>
+              <a:rPr lang="en-US" b="1" dirty="0"/>
+              <a:t>of cases”</a:t>
+            </a:r>
+            <a:r>
+              <a:rPr lang="en-US" dirty="0"/>
+              <a:t>, the sample reaching this leaf was a person 'Not survived’ and in 27% of the cases, it was a person survived. </a:t>
+            </a:r>
+          </a:p>
+          <a:p>
+            <a:endParaRPr lang="en-US" dirty="0"/>
+          </a:p>
+        </p:txBody>
+      </p:sp>
+      <p:pic>
+        <p:nvPicPr>
+          <p:cNvPr id="5" name="Picture 4">
+            <a:extLst>
+              <a:ext uri="{FF2B5EF4-FFF2-40B4-BE49-F238E27FC236}">
+                <a16:creationId xmlns:a16="http://schemas.microsoft.com/office/drawing/2014/main" id="{DE60AB97-D09C-2C4A-9271-CFF39455BD90}"/>
+              </a:ext>
+            </a:extLst>
+          </p:cNvPr>
+          <p:cNvPicPr>
+            <a:picLocks noChangeAspect="1"/>
+          </p:cNvPicPr>
+          <p:nvPr/>
+        </p:nvPicPr>
+        <p:blipFill>
+          <a:blip r:embed="rId2"/>
+          <a:stretch>
+            <a:fillRect/>
+          </a:stretch>
+        </p:blipFill>
+        <p:spPr>
+          <a:xfrm>
+            <a:off x="624928" y="1566041"/>
+            <a:ext cx="10728872" cy="2363040"/>
+          </a:xfrm>
+          <a:prstGeom prst="rect">
+            <a:avLst/>
+          </a:prstGeom>
+        </p:spPr>
+      </p:pic>
+    </p:spTree>
+    <p:extLst>
+      <p:ext uri="{BB962C8B-B14F-4D97-AF65-F5344CB8AC3E}">
+        <p14:creationId xmlns:p14="http://schemas.microsoft.com/office/powerpoint/2010/main" val="1637291432"/>
+      </p:ext>
+    </p:extLst>
+  </p:cSld>
+  <p:clrMapOvr>
+    <a:masterClrMapping/>
+  </p:clrMapOvr>
+</p:sld>
+</file>
+
+<file path=ppt/slides/slide12.xml><?xml version="1.0" encoding="utf-8"?>
+<p:sld xmlns:a="http://schemas.openxmlformats.org/drawingml/2006/main" xmlns:r="http://schemas.openxmlformats.org/officeDocument/2006/relationships" xmlns:p="http://schemas.openxmlformats.org/presentationml/2006/main">
+  <p:cSld>
+    <p:spTree>
+      <p:nvGrpSpPr>
+        <p:cNvPr id="1" name=""/>
+        <p:cNvGrpSpPr/>
+        <p:nvPr/>
+      </p:nvGrpSpPr>
+      <p:grpSpPr>
+        <a:xfrm>
+          <a:off x="0" y="0"/>
+          <a:ext cx="0" cy="0"/>
+          <a:chOff x="0" y="0"/>
+          <a:chExt cx="0" cy="0"/>
+        </a:xfrm>
+      </p:grpSpPr>
       <p:sp>
         <p:nvSpPr>
           <p:cNvPr id="2" name="Title 1">
@@ -3529,7 +3777,7 @@
 </p:sld>
 </file>
 
-<file path=ppt/slides/slide11.xml><?xml version="1.0" encoding="utf-8"?>
+<file path=ppt/slides/slide13.xml><?xml version="1.0" encoding="utf-8"?>
 <p:sld xmlns:a="http://schemas.openxmlformats.org/drawingml/2006/main" xmlns:r="http://schemas.openxmlformats.org/officeDocument/2006/relationships" xmlns:p="http://schemas.openxmlformats.org/presentationml/2006/main">
   <p:cSld>
     <p:spTree>
@@ -3652,7 +3900,7 @@
 </p:sld>
 </file>
 
-<file path=ppt/slides/slide12.xml><?xml version="1.0" encoding="utf-8"?>
+<file path=ppt/slides/slide14.xml><?xml version="1.0" encoding="utf-8"?>
 <p:sld xmlns:a="http://schemas.openxmlformats.org/drawingml/2006/main" xmlns:r="http://schemas.openxmlformats.org/officeDocument/2006/relationships" xmlns:p="http://schemas.openxmlformats.org/presentationml/2006/main">
   <p:cSld>
     <p:spTree>
@@ -3811,7 +4059,7 @@
 </p:sld>
 </file>
 
-<file path=ppt/slides/slide13.xml><?xml version="1.0" encoding="utf-8"?>
+<file path=ppt/slides/slide15.xml><?xml version="1.0" encoding="utf-8"?>
 <p:sld xmlns:a="http://schemas.openxmlformats.org/drawingml/2006/main" xmlns:r="http://schemas.openxmlformats.org/officeDocument/2006/relationships" xmlns:p="http://schemas.openxmlformats.org/presentationml/2006/main">
   <p:cSld>
     <p:spTree>
@@ -3948,7 +4196,7 @@
 </p:sld>
 </file>
 
-<file path=ppt/slides/slide14.xml><?xml version="1.0" encoding="utf-8"?>
+<file path=ppt/slides/slide16.xml><?xml version="1.0" encoding="utf-8"?>
 <p:sld xmlns:a="http://schemas.openxmlformats.org/drawingml/2006/main" xmlns:r="http://schemas.openxmlformats.org/officeDocument/2006/relationships" xmlns:p="http://schemas.openxmlformats.org/presentationml/2006/main">
   <p:cSld>
     <p:spTree>
@@ -4103,7 +4351,7 @@
 </p:sld>
 </file>
 
-<file path=ppt/slides/slide15.xml><?xml version="1.0" encoding="utf-8"?>
+<file path=ppt/slides/slide17.xml><?xml version="1.0" encoding="utf-8"?>
 <p:sld xmlns:a="http://schemas.openxmlformats.org/drawingml/2006/main" xmlns:r="http://schemas.openxmlformats.org/officeDocument/2006/relationships" xmlns:p="http://schemas.openxmlformats.org/presentationml/2006/main">
   <p:cSld>
     <p:spTree>
@@ -4202,7 +4450,7 @@
 </p:sld>
 </file>
 
-<file path=ppt/slides/slide16.xml><?xml version="1.0" encoding="utf-8"?>
+<file path=ppt/slides/slide18.xml><?xml version="1.0" encoding="utf-8"?>
 <p:sld xmlns:a="http://schemas.openxmlformats.org/drawingml/2006/main" xmlns:r="http://schemas.openxmlformats.org/officeDocument/2006/relationships" xmlns:p="http://schemas.openxmlformats.org/presentationml/2006/main">
   <p:cSld>
     <p:spTree>
@@ -4300,7 +4548,7 @@
 </p:sld>
 </file>
 
-<file path=ppt/slides/slide17.xml><?xml version="1.0" encoding="utf-8"?>
+<file path=ppt/slides/slide19.xml><?xml version="1.0" encoding="utf-8"?>
 <p:sld xmlns:a="http://schemas.openxmlformats.org/drawingml/2006/main" xmlns:r="http://schemas.openxmlformats.org/officeDocument/2006/relationships" xmlns:p="http://schemas.openxmlformats.org/presentationml/2006/main">
   <p:cSld>
     <p:spTree>
@@ -4963,61 +5211,62 @@
           <p:cNvPr id="2" name="Title 1">
             <a:extLst>
               <a:ext uri="{FF2B5EF4-FFF2-40B4-BE49-F238E27FC236}">
-                <a16:creationId xmlns:a16="http://schemas.microsoft.com/office/drawing/2014/main" id="{99DE39C2-C292-F64F-AEAA-27A81877135E}"/>
-              </a:ext>
-            </a:extLst>
-          </p:cNvPr>
-          <p:cNvSpPr>
-            <a:spLocks noGrp="1"/>
-          </p:cNvSpPr>
-          <p:nvPr>
-            <p:ph type="ctrTitle"/>
-          </p:nvPr>
-        </p:nvSpPr>
-        <p:spPr/>
-        <p:txBody>
-          <a:bodyPr/>
-          <a:lstStyle/>
-          <a:p>
-            <a:r>
-              <a:rPr lang="en-US" dirty="0"/>
-              <a:t>Our homework problem</a:t>
-            </a:r>
-          </a:p>
-        </p:txBody>
-      </p:sp>
-      <p:sp>
-        <p:nvSpPr>
-          <p:cNvPr id="3" name="Text Placeholder 2">
-            <a:extLst>
-              <a:ext uri="{FF2B5EF4-FFF2-40B4-BE49-F238E27FC236}">
-                <a16:creationId xmlns:a16="http://schemas.microsoft.com/office/drawing/2014/main" id="{63B5F603-CA8C-C346-AA70-F289301119BE}"/>
-              </a:ext>
-            </a:extLst>
-          </p:cNvPr>
-          <p:cNvSpPr>
-            <a:spLocks noGrp="1"/>
-          </p:cNvSpPr>
-          <p:nvPr>
-            <p:ph type="subTitle" idx="1"/>
-          </p:nvPr>
-        </p:nvSpPr>
-        <p:spPr/>
-        <p:txBody>
-          <a:bodyPr/>
-          <a:lstStyle/>
-          <a:p>
-            <a:r>
-              <a:rPr lang="en-US" dirty="0"/>
-              <a:t>11062020</a:t>
-            </a:r>
-          </a:p>
-        </p:txBody>
-      </p:sp>
+                <a16:creationId xmlns:a16="http://schemas.microsoft.com/office/drawing/2014/main" id="{2CF6D681-649C-A442-8387-536D25131D58}"/>
+              </a:ext>
+            </a:extLst>
+          </p:cNvPr>
+          <p:cNvSpPr>
+            <a:spLocks noGrp="1"/>
+          </p:cNvSpPr>
+          <p:nvPr>
+            <p:ph type="title"/>
+          </p:nvPr>
+        </p:nvSpPr>
+        <p:spPr/>
+        <p:txBody>
+          <a:bodyPr/>
+          <a:lstStyle/>
+          <a:p>
+            <a:r>
+              <a:rPr lang="en-US" dirty="0"/>
+              <a:t>My note on machine learning</a:t>
+            </a:r>
+          </a:p>
+        </p:txBody>
+      </p:sp>
+      <p:pic>
+        <p:nvPicPr>
+          <p:cNvPr id="5" name="Content Placeholder 4">
+            <a:extLst>
+              <a:ext uri="{FF2B5EF4-FFF2-40B4-BE49-F238E27FC236}">
+                <a16:creationId xmlns:a16="http://schemas.microsoft.com/office/drawing/2014/main" id="{350D0DDE-82E2-7446-9C4F-F85B2D8DEB13}"/>
+              </a:ext>
+            </a:extLst>
+          </p:cNvPr>
+          <p:cNvPicPr>
+            <a:picLocks noGrp="1" noChangeAspect="1"/>
+          </p:cNvPicPr>
+          <p:nvPr>
+            <p:ph idx="4294967295"/>
+          </p:nvPr>
+        </p:nvPicPr>
+        <p:blipFill>
+          <a:blip r:embed="rId2"/>
+          <a:stretch>
+            <a:fillRect/>
+          </a:stretch>
+        </p:blipFill>
+        <p:spPr>
+          <a:xfrm>
+            <a:off x="3073927" y="1562100"/>
+            <a:ext cx="5898623" cy="5212163"/>
+          </a:xfrm>
+        </p:spPr>
+      </p:pic>
     </p:spTree>
     <p:extLst>
       <p:ext uri="{BB962C8B-B14F-4D97-AF65-F5344CB8AC3E}">
-        <p14:creationId xmlns:p14="http://schemas.microsoft.com/office/powerpoint/2010/main" val="2349103487"/>
+        <p14:creationId xmlns:p14="http://schemas.microsoft.com/office/powerpoint/2010/main" val="2992908058"/>
       </p:ext>
     </p:extLst>
   </p:cSld>
@@ -5044,42 +5293,12 @@
           <a:chExt cx="0" cy="0"/>
         </a:xfrm>
       </p:grpSpPr>
-      <p:pic>
-        <p:nvPicPr>
-          <p:cNvPr id="3" name="Picture 2">
-            <a:extLst>
-              <a:ext uri="{FF2B5EF4-FFF2-40B4-BE49-F238E27FC236}">
-                <a16:creationId xmlns:a16="http://schemas.microsoft.com/office/drawing/2014/main" id="{16FD1929-1A9B-7346-BE9B-D84FEEF402AA}"/>
-              </a:ext>
-            </a:extLst>
-          </p:cNvPr>
-          <p:cNvPicPr>
-            <a:picLocks noChangeAspect="1"/>
-          </p:cNvPicPr>
-          <p:nvPr/>
-        </p:nvPicPr>
-        <p:blipFill>
-          <a:blip r:embed="rId2"/>
-          <a:stretch>
-            <a:fillRect/>
-          </a:stretch>
-        </p:blipFill>
-        <p:spPr>
-          <a:xfrm>
-            <a:off x="1387906" y="1571530"/>
-            <a:ext cx="9416188" cy="5286470"/>
-          </a:xfrm>
-          <a:prstGeom prst="rect">
-            <a:avLst/>
-          </a:prstGeom>
-        </p:spPr>
-      </p:pic>
-      <p:sp>
-        <p:nvSpPr>
-          <p:cNvPr id="4" name="Title 3">
-            <a:extLst>
-              <a:ext uri="{FF2B5EF4-FFF2-40B4-BE49-F238E27FC236}">
-                <a16:creationId xmlns:a16="http://schemas.microsoft.com/office/drawing/2014/main" id="{FCA2A36D-A4D2-C147-B7DB-912EA1F06409}"/>
+      <p:sp>
+        <p:nvSpPr>
+          <p:cNvPr id="2" name="Title 1">
+            <a:extLst>
+              <a:ext uri="{FF2B5EF4-FFF2-40B4-BE49-F238E27FC236}">
+                <a16:creationId xmlns:a16="http://schemas.microsoft.com/office/drawing/2014/main" id="{B62882B0-0A11-F846-9237-33012FD48D3A}"/>
               </a:ext>
             </a:extLst>
           </p:cNvPr>
@@ -5097,15 +5316,88 @@
           <a:p>
             <a:r>
               <a:rPr lang="en-US" dirty="0"/>
-              <a:t>Proposed tree structure</a:t>
-            </a:r>
+              <a:t>A few very good learning portals</a:t>
+            </a:r>
+          </a:p>
+        </p:txBody>
+      </p:sp>
+      <p:sp>
+        <p:nvSpPr>
+          <p:cNvPr id="3" name="Content Placeholder 2">
+            <a:extLst>
+              <a:ext uri="{FF2B5EF4-FFF2-40B4-BE49-F238E27FC236}">
+                <a16:creationId xmlns:a16="http://schemas.microsoft.com/office/drawing/2014/main" id="{995F1EED-D234-9642-9AFB-3B45FBE04ADB}"/>
+              </a:ext>
+            </a:extLst>
+          </p:cNvPr>
+          <p:cNvSpPr>
+            <a:spLocks noGrp="1"/>
+          </p:cNvSpPr>
+          <p:nvPr>
+            <p:ph idx="1"/>
+          </p:nvPr>
+        </p:nvSpPr>
+        <p:spPr/>
+        <p:txBody>
+          <a:bodyPr/>
+          <a:lstStyle/>
+          <a:p>
+            <a:r>
+              <a:rPr lang="en-US" dirty="0">
+                <a:hlinkClick r:id="rId2"/>
+              </a:rPr>
+              <a:t>https://www.kdnuggets.com/2020/01/decision-tree-algorithm-explained.html</a:t>
+            </a:r>
+            <a:endParaRPr lang="en-US" dirty="0"/>
+          </a:p>
+          <a:p>
+            <a:r>
+              <a:rPr lang="en-US" dirty="0">
+                <a:hlinkClick r:id="rId3"/>
+              </a:rPr>
+              <a:t>https://dataaspirant.com/how-decision-tree-algorithm-works/</a:t>
+            </a:r>
+            <a:endParaRPr lang="en-US" dirty="0"/>
+          </a:p>
+          <a:p>
+            <a:r>
+              <a:rPr lang="en-US" dirty="0">
+                <a:hlinkClick r:id="rId4"/>
+              </a:rPr>
+              <a:t>https://www.geeksforgeeks.org/decision-tree-introduction-example/</a:t>
+            </a:r>
+            <a:endParaRPr lang="en-US" dirty="0"/>
+          </a:p>
+          <a:p>
+            <a:r>
+              <a:rPr lang="en-US" dirty="0">
+                <a:hlinkClick r:id="rId5"/>
+              </a:rPr>
+              <a:t>https://towardsdatascience.com/machine-learning-basics-descision-tree-from-scratch-part-i-4251bfa1b45c</a:t>
+            </a:r>
+            <a:endParaRPr lang="en-US" dirty="0"/>
+          </a:p>
+          <a:p>
+            <a:r>
+              <a:rPr lang="en-US" dirty="0">
+                <a:hlinkClick r:id="rId6"/>
+              </a:rPr>
+              <a:t>https://www.geeksforgeeks.org/decision-tree-implementation-python/</a:t>
+            </a:r>
+            <a:endParaRPr lang="en-US" dirty="0"/>
+          </a:p>
+          <a:p>
+            <a:pPr marL="0" indent="0">
+              <a:buNone/>
+            </a:pPr>
+            <a:endParaRPr lang="en-US" dirty="0"/>
           </a:p>
         </p:txBody>
       </p:sp>
     </p:spTree>
     <p:extLst>
       <p:ext uri="{BB962C8B-B14F-4D97-AF65-F5344CB8AC3E}">
-        <p14:creationId xmlns:p14="http://schemas.microsoft.com/office/powerpoint/2010/main" val="3124676997"/>
+        <p14:creationId xmlns:p14="http://schemas.microsoft.com/office/powerpoint/2010/main" val="4024927500"/>
       </p:ext>
     </p:extLst>
   </p:cSld>
@@ -5137,128 +5429,61 @@
           <p:cNvPr id="2" name="Title 1">
             <a:extLst>
               <a:ext uri="{FF2B5EF4-FFF2-40B4-BE49-F238E27FC236}">
-                <a16:creationId xmlns:a16="http://schemas.microsoft.com/office/drawing/2014/main" id="{AB85EEDA-C853-2944-BAA7-5F83281F0C81}"/>
-              </a:ext>
-            </a:extLst>
-          </p:cNvPr>
-          <p:cNvSpPr>
-            <a:spLocks noGrp="1"/>
-          </p:cNvSpPr>
-          <p:nvPr>
-            <p:ph type="title"/>
-          </p:nvPr>
-        </p:nvSpPr>
-        <p:spPr/>
-        <p:txBody>
-          <a:bodyPr/>
-          <a:lstStyle/>
-          <a:p>
-            <a:r>
-              <a:rPr lang="en-US" dirty="0"/>
-              <a:t>An example in the home work</a:t>
-            </a:r>
-          </a:p>
-        </p:txBody>
-      </p:sp>
-      <p:sp>
-        <p:nvSpPr>
-          <p:cNvPr id="3" name="Content Placeholder 2">
-            <a:extLst>
-              <a:ext uri="{FF2B5EF4-FFF2-40B4-BE49-F238E27FC236}">
-                <a16:creationId xmlns:a16="http://schemas.microsoft.com/office/drawing/2014/main" id="{A8E96563-E860-2C4E-85F9-EB945949B09E}"/>
-              </a:ext>
-            </a:extLst>
-          </p:cNvPr>
-          <p:cNvSpPr>
-            <a:spLocks noGrp="1"/>
-          </p:cNvSpPr>
-          <p:nvPr>
-            <p:ph idx="1"/>
-          </p:nvPr>
-        </p:nvSpPr>
-        <p:spPr>
-          <a:xfrm>
-            <a:off x="731564" y="4095859"/>
-            <a:ext cx="10515600" cy="2546678"/>
-          </a:xfrm>
-        </p:spPr>
-        <p:txBody>
-          <a:bodyPr/>
-          <a:lstStyle/>
-          <a:p>
-            <a:r>
-              <a:rPr lang="en-US" dirty="0"/>
-              <a:t>For example, for the leaf corresponding to the decision [ Female, Age &lt;9, sibling &lt;2.9] </a:t>
-            </a:r>
-          </a:p>
-          <a:p>
-            <a:pPr lvl="1"/>
-            <a:r>
-              <a:rPr lang="en-US" dirty="0"/>
-              <a:t>Could be “arbitrary” but not in this example?</a:t>
-            </a:r>
-          </a:p>
-          <a:p>
-            <a:r>
-              <a:rPr lang="en-US" dirty="0"/>
-              <a:t>It was observed that in “</a:t>
-            </a:r>
-            <a:r>
-              <a:rPr lang="en-US" b="1" dirty="0">
-                <a:solidFill>
-                  <a:srgbClr val="FF0000"/>
-                </a:solidFill>
-              </a:rPr>
-              <a:t>73% </a:t>
-            </a:r>
-            <a:r>
-              <a:rPr lang="en-US" b="1" dirty="0"/>
-              <a:t>of cases”</a:t>
-            </a:r>
-            <a:r>
-              <a:rPr lang="en-US" dirty="0"/>
-              <a:t>, the sample reaching this leaf was a person 'Not survived’ and in 27% of the cases, it was a person survived. </a:t>
-            </a:r>
-          </a:p>
-          <a:p>
-            <a:endParaRPr lang="en-US" dirty="0"/>
-          </a:p>
-        </p:txBody>
-      </p:sp>
-      <p:pic>
-        <p:nvPicPr>
-          <p:cNvPr id="5" name="Picture 4">
-            <a:extLst>
-              <a:ext uri="{FF2B5EF4-FFF2-40B4-BE49-F238E27FC236}">
-                <a16:creationId xmlns:a16="http://schemas.microsoft.com/office/drawing/2014/main" id="{DE60AB97-D09C-2C4A-9271-CFF39455BD90}"/>
-              </a:ext>
-            </a:extLst>
-          </p:cNvPr>
-          <p:cNvPicPr>
-            <a:picLocks noChangeAspect="1"/>
-          </p:cNvPicPr>
-          <p:nvPr/>
-        </p:nvPicPr>
-        <p:blipFill>
-          <a:blip r:embed="rId2"/>
-          <a:stretch>
-            <a:fillRect/>
-          </a:stretch>
-        </p:blipFill>
-        <p:spPr>
-          <a:xfrm>
-            <a:off x="624928" y="1566041"/>
-            <a:ext cx="10728872" cy="2363040"/>
-          </a:xfrm>
-          <a:prstGeom prst="rect">
-            <a:avLst/>
-          </a:prstGeom>
-        </p:spPr>
-      </p:pic>
+                <a16:creationId xmlns:a16="http://schemas.microsoft.com/office/drawing/2014/main" id="{99DE39C2-C292-F64F-AEAA-27A81877135E}"/>
+              </a:ext>
+            </a:extLst>
+          </p:cNvPr>
+          <p:cNvSpPr>
+            <a:spLocks noGrp="1"/>
+          </p:cNvSpPr>
+          <p:nvPr>
+            <p:ph type="ctrTitle"/>
+          </p:nvPr>
+        </p:nvSpPr>
+        <p:spPr/>
+        <p:txBody>
+          <a:bodyPr/>
+          <a:lstStyle/>
+          <a:p>
+            <a:r>
+              <a:rPr lang="en-US" dirty="0"/>
+              <a:t>Our homework problem</a:t>
+            </a:r>
+          </a:p>
+        </p:txBody>
+      </p:sp>
+      <p:sp>
+        <p:nvSpPr>
+          <p:cNvPr id="3" name="Text Placeholder 2">
+            <a:extLst>
+              <a:ext uri="{FF2B5EF4-FFF2-40B4-BE49-F238E27FC236}">
+                <a16:creationId xmlns:a16="http://schemas.microsoft.com/office/drawing/2014/main" id="{63B5F603-CA8C-C346-AA70-F289301119BE}"/>
+              </a:ext>
+            </a:extLst>
+          </p:cNvPr>
+          <p:cNvSpPr>
+            <a:spLocks noGrp="1"/>
+          </p:cNvSpPr>
+          <p:nvPr>
+            <p:ph type="subTitle" idx="1"/>
+          </p:nvPr>
+        </p:nvSpPr>
+        <p:spPr/>
+        <p:txBody>
+          <a:bodyPr/>
+          <a:lstStyle/>
+          <a:p>
+            <a:r>
+              <a:rPr lang="en-US" dirty="0"/>
+              <a:t>11062020</a:t>
+            </a:r>
+          </a:p>
+        </p:txBody>
+      </p:sp>
     </p:spTree>
     <p:extLst>
       <p:ext uri="{BB962C8B-B14F-4D97-AF65-F5344CB8AC3E}">
-        <p14:creationId xmlns:p14="http://schemas.microsoft.com/office/powerpoint/2010/main" val="1637291432"/>
+        <p14:creationId xmlns:p14="http://schemas.microsoft.com/office/powerpoint/2010/main" val="2349103487"/>
       </p:ext>
     </p:extLst>
   </p:cSld>

</xml_diff>